<commit_message>
Commit for Use Update
</commit_message>
<xml_diff>
--- a/gameJamName/gameJamName - Image Files/gameJamName - Image Initializer.pptx
+++ b/gameJamName/gameJamName - Image Files/gameJamName - Image Initializer.pptx
@@ -104,6 +104,11 @@
       </a:defRPr>
     </a:lvl9pPr>
   </p:defaultTextStyle>
+  <p:extLst>
+    <p:ext uri="{EFAFB233-063F-42B5-8137-9DF3F51BA10A}">
+      <p15:sldGuideLst xmlns:p15="http://schemas.microsoft.com/office/powerpoint/2012/main"/>
+    </p:ext>
+  </p:extLst>
 </p:presentation>
 </file>
 
@@ -238,7 +243,7 @@
           <a:p>
             <a:fld id="{1CB1AD02-714A-4324-8EFD-214DDF861471}" type="datetimeFigureOut">
               <a:rPr lang="en-US" smtClean="0"/>
-              <a:t>9/10/2022</a:t>
+              <a:t>9/12/2022</a:t>
             </a:fld>
             <a:endParaRPr lang="en-US"/>
           </a:p>
@@ -408,7 +413,7 @@
           <a:p>
             <a:fld id="{1CB1AD02-714A-4324-8EFD-214DDF861471}" type="datetimeFigureOut">
               <a:rPr lang="en-US" smtClean="0"/>
-              <a:t>9/10/2022</a:t>
+              <a:t>9/12/2022</a:t>
             </a:fld>
             <a:endParaRPr lang="en-US"/>
           </a:p>
@@ -588,7 +593,7 @@
           <a:p>
             <a:fld id="{1CB1AD02-714A-4324-8EFD-214DDF861471}" type="datetimeFigureOut">
               <a:rPr lang="en-US" smtClean="0"/>
-              <a:t>9/10/2022</a:t>
+              <a:t>9/12/2022</a:t>
             </a:fld>
             <a:endParaRPr lang="en-US"/>
           </a:p>
@@ -758,7 +763,7 @@
           <a:p>
             <a:fld id="{1CB1AD02-714A-4324-8EFD-214DDF861471}" type="datetimeFigureOut">
               <a:rPr lang="en-US" smtClean="0"/>
-              <a:t>9/10/2022</a:t>
+              <a:t>9/12/2022</a:t>
             </a:fld>
             <a:endParaRPr lang="en-US"/>
           </a:p>
@@ -1004,7 +1009,7 @@
           <a:p>
             <a:fld id="{1CB1AD02-714A-4324-8EFD-214DDF861471}" type="datetimeFigureOut">
               <a:rPr lang="en-US" smtClean="0"/>
-              <a:t>9/10/2022</a:t>
+              <a:t>9/12/2022</a:t>
             </a:fld>
             <a:endParaRPr lang="en-US"/>
           </a:p>
@@ -1236,7 +1241,7 @@
           <a:p>
             <a:fld id="{1CB1AD02-714A-4324-8EFD-214DDF861471}" type="datetimeFigureOut">
               <a:rPr lang="en-US" smtClean="0"/>
-              <a:t>9/10/2022</a:t>
+              <a:t>9/12/2022</a:t>
             </a:fld>
             <a:endParaRPr lang="en-US"/>
           </a:p>
@@ -1603,7 +1608,7 @@
           <a:p>
             <a:fld id="{1CB1AD02-714A-4324-8EFD-214DDF861471}" type="datetimeFigureOut">
               <a:rPr lang="en-US" smtClean="0"/>
-              <a:t>9/10/2022</a:t>
+              <a:t>9/12/2022</a:t>
             </a:fld>
             <a:endParaRPr lang="en-US"/>
           </a:p>
@@ -1721,7 +1726,7 @@
           <a:p>
             <a:fld id="{1CB1AD02-714A-4324-8EFD-214DDF861471}" type="datetimeFigureOut">
               <a:rPr lang="en-US" smtClean="0"/>
-              <a:t>9/10/2022</a:t>
+              <a:t>9/12/2022</a:t>
             </a:fld>
             <a:endParaRPr lang="en-US"/>
           </a:p>
@@ -1816,7 +1821,7 @@
           <a:p>
             <a:fld id="{1CB1AD02-714A-4324-8EFD-214DDF861471}" type="datetimeFigureOut">
               <a:rPr lang="en-US" smtClean="0"/>
-              <a:t>9/10/2022</a:t>
+              <a:t>9/12/2022</a:t>
             </a:fld>
             <a:endParaRPr lang="en-US"/>
           </a:p>
@@ -2093,7 +2098,7 @@
           <a:p>
             <a:fld id="{1CB1AD02-714A-4324-8EFD-214DDF861471}" type="datetimeFigureOut">
               <a:rPr lang="en-US" smtClean="0"/>
-              <a:t>9/10/2022</a:t>
+              <a:t>9/12/2022</a:t>
             </a:fld>
             <a:endParaRPr lang="en-US"/>
           </a:p>
@@ -2346,7 +2351,7 @@
           <a:p>
             <a:fld id="{1CB1AD02-714A-4324-8EFD-214DDF861471}" type="datetimeFigureOut">
               <a:rPr lang="en-US" smtClean="0"/>
-              <a:t>9/10/2022</a:t>
+              <a:t>9/12/2022</a:t>
             </a:fld>
             <a:endParaRPr lang="en-US"/>
           </a:p>
@@ -2559,7 +2564,7 @@
           <a:p>
             <a:fld id="{1CB1AD02-714A-4324-8EFD-214DDF861471}" type="datetimeFigureOut">
               <a:rPr lang="en-US" smtClean="0"/>
-              <a:t>9/10/2022</a:t>
+              <a:t>9/12/2022</a:t>
             </a:fld>
             <a:endParaRPr lang="en-US"/>
           </a:p>
@@ -2964,44 +2969,3054 @@
           <a:chExt cx="0" cy="0"/>
         </a:xfrm>
       </p:grpSpPr>
-      <p:sp>
-        <p:nvSpPr>
-          <p:cNvPr id="2" name="Title 1"/>
-          <p:cNvSpPr>
-            <a:spLocks noGrp="1"/>
-          </p:cNvSpPr>
-          <p:nvPr>
-            <p:ph type="ctrTitle"/>
-          </p:nvPr>
-        </p:nvSpPr>
-        <p:spPr/>
-        <p:txBody>
-          <a:bodyPr/>
+      <p:grpSp>
+        <p:nvGrpSpPr>
+          <p:cNvPr id="18" name="Group 17"/>
+          <p:cNvGrpSpPr/>
+          <p:nvPr/>
+        </p:nvGrpSpPr>
+        <p:grpSpPr>
+          <a:xfrm>
+            <a:off x="0" y="-9484"/>
+            <a:ext cx="4059936" cy="2286000"/>
+            <a:chOff x="0" y="3107"/>
+            <a:chExt cx="4740752" cy="2846708"/>
+          </a:xfrm>
+        </p:grpSpPr>
+        <p:sp>
+          <p:nvSpPr>
+            <p:cNvPr id="17" name="Rectangle 16"/>
+            <p:cNvSpPr/>
+            <p:nvPr/>
+          </p:nvSpPr>
+          <p:spPr>
+            <a:xfrm>
+              <a:off x="0" y="3107"/>
+              <a:ext cx="4740752" cy="2131801"/>
+            </a:xfrm>
+            <a:prstGeom prst="rect">
+              <a:avLst/>
+            </a:prstGeom>
+            <a:solidFill>
+              <a:schemeClr val="accent1">
+                <a:lumMod val="40000"/>
+                <a:lumOff val="60000"/>
+              </a:schemeClr>
+            </a:solidFill>
+            <a:ln>
+              <a:solidFill>
+                <a:schemeClr val="tx1"/>
+              </a:solidFill>
+            </a:ln>
+          </p:spPr>
+          <p:style>
+            <a:lnRef idx="2">
+              <a:schemeClr val="accent1">
+                <a:shade val="50000"/>
+              </a:schemeClr>
+            </a:lnRef>
+            <a:fillRef idx="1">
+              <a:schemeClr val="accent1"/>
+            </a:fillRef>
+            <a:effectRef idx="0">
+              <a:schemeClr val="accent1"/>
+            </a:effectRef>
+            <a:fontRef idx="minor">
+              <a:schemeClr val="lt1"/>
+            </a:fontRef>
+          </p:style>
+          <p:txBody>
+            <a:bodyPr rtlCol="0" anchor="ctr"/>
+            <a:lstStyle/>
+            <a:p>
+              <a:pPr algn="ctr"/>
+              <a:endParaRPr lang="en-US"/>
+            </a:p>
+          </p:txBody>
+        </p:sp>
+        <p:sp>
+          <p:nvSpPr>
+            <p:cNvPr id="9" name="Rectangle 8"/>
+            <p:cNvSpPr/>
+            <p:nvPr/>
+          </p:nvSpPr>
+          <p:spPr>
+            <a:xfrm>
+              <a:off x="0" y="2418124"/>
+              <a:ext cx="4740752" cy="431691"/>
+            </a:xfrm>
+            <a:prstGeom prst="rect">
+              <a:avLst/>
+            </a:prstGeom>
+            <a:solidFill>
+              <a:schemeClr val="accent6">
+                <a:lumMod val="60000"/>
+                <a:lumOff val="40000"/>
+              </a:schemeClr>
+            </a:solidFill>
+            <a:ln>
+              <a:solidFill>
+                <a:schemeClr val="tx1"/>
+              </a:solidFill>
+            </a:ln>
+          </p:spPr>
+          <p:style>
+            <a:lnRef idx="2">
+              <a:schemeClr val="accent1">
+                <a:shade val="50000"/>
+              </a:schemeClr>
+            </a:lnRef>
+            <a:fillRef idx="1">
+              <a:schemeClr val="accent1"/>
+            </a:fillRef>
+            <a:effectRef idx="0">
+              <a:schemeClr val="accent1"/>
+            </a:effectRef>
+            <a:fontRef idx="minor">
+              <a:schemeClr val="lt1"/>
+            </a:fontRef>
+          </p:style>
+          <p:txBody>
+            <a:bodyPr rtlCol="0" anchor="ctr"/>
+            <a:lstStyle/>
+            <a:p>
+              <a:pPr algn="ctr"/>
+              <a:endParaRPr lang="en-US"/>
+            </a:p>
+          </p:txBody>
+        </p:sp>
+        <p:sp>
+          <p:nvSpPr>
+            <p:cNvPr id="8" name="Rectangle 7"/>
+            <p:cNvSpPr/>
+            <p:nvPr/>
+          </p:nvSpPr>
+          <p:spPr>
+            <a:xfrm>
+              <a:off x="0" y="2134908"/>
+              <a:ext cx="4740752" cy="283216"/>
+            </a:xfrm>
+            <a:prstGeom prst="rect">
+              <a:avLst/>
+            </a:prstGeom>
+            <a:pattFill prst="wdUpDiag">
+              <a:fgClr>
+                <a:schemeClr val="accent6">
+                  <a:lumMod val="60000"/>
+                  <a:lumOff val="40000"/>
+                </a:schemeClr>
+              </a:fgClr>
+              <a:bgClr>
+                <a:schemeClr val="bg1"/>
+              </a:bgClr>
+            </a:pattFill>
+            <a:ln>
+              <a:solidFill>
+                <a:schemeClr val="tx1"/>
+              </a:solidFill>
+            </a:ln>
+          </p:spPr>
+          <p:style>
+            <a:lnRef idx="2">
+              <a:schemeClr val="accent1">
+                <a:shade val="50000"/>
+              </a:schemeClr>
+            </a:lnRef>
+            <a:fillRef idx="1">
+              <a:schemeClr val="accent1"/>
+            </a:fillRef>
+            <a:effectRef idx="0">
+              <a:schemeClr val="accent1"/>
+            </a:effectRef>
+            <a:fontRef idx="minor">
+              <a:schemeClr val="lt1"/>
+            </a:fontRef>
+          </p:style>
+          <p:txBody>
+            <a:bodyPr rtlCol="0" anchor="ctr"/>
+            <a:lstStyle/>
+            <a:p>
+              <a:pPr algn="ctr"/>
+              <a:endParaRPr lang="en-US"/>
+            </a:p>
+          </p:txBody>
+        </p:sp>
+      </p:grpSp>
+      <p:grpSp>
+        <p:nvGrpSpPr>
+          <p:cNvPr id="27" name="Group 26"/>
+          <p:cNvGrpSpPr/>
+          <p:nvPr/>
+        </p:nvGrpSpPr>
+        <p:grpSpPr>
+          <a:xfrm>
+            <a:off x="4066032" y="-9484"/>
+            <a:ext cx="4059936" cy="2286000"/>
+            <a:chOff x="0" y="3107"/>
+            <a:chExt cx="4740752" cy="2846708"/>
+          </a:xfrm>
+        </p:grpSpPr>
+        <p:sp>
+          <p:nvSpPr>
+            <p:cNvPr id="28" name="Rectangle 27"/>
+            <p:cNvSpPr/>
+            <p:nvPr/>
+          </p:nvSpPr>
+          <p:spPr>
+            <a:xfrm>
+              <a:off x="0" y="3107"/>
+              <a:ext cx="4740752" cy="2131801"/>
+            </a:xfrm>
+            <a:prstGeom prst="rect">
+              <a:avLst/>
+            </a:prstGeom>
+            <a:solidFill>
+              <a:schemeClr val="accent5">
+                <a:lumMod val="60000"/>
+                <a:lumOff val="40000"/>
+              </a:schemeClr>
+            </a:solidFill>
+            <a:ln>
+              <a:solidFill>
+                <a:schemeClr val="tx1"/>
+              </a:solidFill>
+            </a:ln>
+          </p:spPr>
+          <p:style>
+            <a:lnRef idx="2">
+              <a:schemeClr val="accent1">
+                <a:shade val="50000"/>
+              </a:schemeClr>
+            </a:lnRef>
+            <a:fillRef idx="1">
+              <a:schemeClr val="accent1"/>
+            </a:fillRef>
+            <a:effectRef idx="0">
+              <a:schemeClr val="accent1"/>
+            </a:effectRef>
+            <a:fontRef idx="minor">
+              <a:schemeClr val="lt1"/>
+            </a:fontRef>
+          </p:style>
+          <p:txBody>
+            <a:bodyPr rtlCol="0" anchor="ctr"/>
+            <a:lstStyle/>
+            <a:p>
+              <a:pPr algn="ctr"/>
+              <a:endParaRPr lang="en-US"/>
+            </a:p>
+          </p:txBody>
+        </p:sp>
+        <p:sp>
+          <p:nvSpPr>
+            <p:cNvPr id="29" name="Rectangle 28"/>
+            <p:cNvSpPr/>
+            <p:nvPr/>
+          </p:nvSpPr>
+          <p:spPr>
+            <a:xfrm>
+              <a:off x="0" y="2418124"/>
+              <a:ext cx="4740752" cy="431691"/>
+            </a:xfrm>
+            <a:prstGeom prst="rect">
+              <a:avLst/>
+            </a:prstGeom>
+            <a:solidFill>
+              <a:schemeClr val="accent6"/>
+            </a:solidFill>
+            <a:ln>
+              <a:solidFill>
+                <a:schemeClr val="tx1"/>
+              </a:solidFill>
+            </a:ln>
+          </p:spPr>
+          <p:style>
+            <a:lnRef idx="2">
+              <a:schemeClr val="accent1">
+                <a:shade val="50000"/>
+              </a:schemeClr>
+            </a:lnRef>
+            <a:fillRef idx="1">
+              <a:schemeClr val="accent1"/>
+            </a:fillRef>
+            <a:effectRef idx="0">
+              <a:schemeClr val="accent1"/>
+            </a:effectRef>
+            <a:fontRef idx="minor">
+              <a:schemeClr val="lt1"/>
+            </a:fontRef>
+          </p:style>
+          <p:txBody>
+            <a:bodyPr rtlCol="0" anchor="ctr"/>
+            <a:lstStyle/>
+            <a:p>
+              <a:pPr algn="ctr"/>
+              <a:endParaRPr lang="en-US"/>
+            </a:p>
+          </p:txBody>
+        </p:sp>
+        <p:sp>
+          <p:nvSpPr>
+            <p:cNvPr id="30" name="Rectangle 29"/>
+            <p:cNvSpPr/>
+            <p:nvPr/>
+          </p:nvSpPr>
+          <p:spPr>
+            <a:xfrm>
+              <a:off x="0" y="2134908"/>
+              <a:ext cx="4740752" cy="283216"/>
+            </a:xfrm>
+            <a:prstGeom prst="rect">
+              <a:avLst/>
+            </a:prstGeom>
+            <a:pattFill prst="wdUpDiag">
+              <a:fgClr>
+                <a:schemeClr val="accent6"/>
+              </a:fgClr>
+              <a:bgClr>
+                <a:schemeClr val="bg1"/>
+              </a:bgClr>
+            </a:pattFill>
+            <a:ln>
+              <a:solidFill>
+                <a:schemeClr val="tx1"/>
+              </a:solidFill>
+            </a:ln>
+          </p:spPr>
+          <p:style>
+            <a:lnRef idx="2">
+              <a:schemeClr val="accent1">
+                <a:shade val="50000"/>
+              </a:schemeClr>
+            </a:lnRef>
+            <a:fillRef idx="1">
+              <a:schemeClr val="accent1"/>
+            </a:fillRef>
+            <a:effectRef idx="0">
+              <a:schemeClr val="accent1"/>
+            </a:effectRef>
+            <a:fontRef idx="minor">
+              <a:schemeClr val="lt1"/>
+            </a:fontRef>
+          </p:style>
+          <p:txBody>
+            <a:bodyPr rtlCol="0" anchor="ctr"/>
+            <a:lstStyle/>
+            <a:p>
+              <a:pPr algn="ctr"/>
+              <a:endParaRPr lang="en-US"/>
+            </a:p>
+          </p:txBody>
+        </p:sp>
+      </p:grpSp>
+      <p:grpSp>
+        <p:nvGrpSpPr>
+          <p:cNvPr id="43" name="Group 42"/>
+          <p:cNvGrpSpPr/>
+          <p:nvPr/>
+        </p:nvGrpSpPr>
+        <p:grpSpPr>
+          <a:xfrm>
+            <a:off x="8132064" y="-9484"/>
+            <a:ext cx="4059936" cy="2286000"/>
+            <a:chOff x="0" y="3107"/>
+            <a:chExt cx="4740752" cy="2846708"/>
+          </a:xfrm>
+        </p:grpSpPr>
+        <p:sp>
+          <p:nvSpPr>
+            <p:cNvPr id="44" name="Rectangle 43"/>
+            <p:cNvSpPr/>
+            <p:nvPr/>
+          </p:nvSpPr>
+          <p:spPr>
+            <a:xfrm>
+              <a:off x="0" y="3107"/>
+              <a:ext cx="4740752" cy="2131801"/>
+            </a:xfrm>
+            <a:prstGeom prst="rect">
+              <a:avLst/>
+            </a:prstGeom>
+            <a:solidFill>
+              <a:schemeClr val="accent5">
+                <a:lumMod val="75000"/>
+              </a:schemeClr>
+            </a:solidFill>
+            <a:ln>
+              <a:solidFill>
+                <a:schemeClr val="tx1"/>
+              </a:solidFill>
+            </a:ln>
+          </p:spPr>
+          <p:style>
+            <a:lnRef idx="2">
+              <a:schemeClr val="accent1">
+                <a:shade val="50000"/>
+              </a:schemeClr>
+            </a:lnRef>
+            <a:fillRef idx="1">
+              <a:schemeClr val="accent1"/>
+            </a:fillRef>
+            <a:effectRef idx="0">
+              <a:schemeClr val="accent1"/>
+            </a:effectRef>
+            <a:fontRef idx="minor">
+              <a:schemeClr val="lt1"/>
+            </a:fontRef>
+          </p:style>
+          <p:txBody>
+            <a:bodyPr rtlCol="0" anchor="ctr"/>
+            <a:lstStyle/>
+            <a:p>
+              <a:pPr algn="ctr"/>
+              <a:endParaRPr lang="en-US"/>
+            </a:p>
+          </p:txBody>
+        </p:sp>
+        <p:sp>
+          <p:nvSpPr>
+            <p:cNvPr id="45" name="Rectangle 44"/>
+            <p:cNvSpPr/>
+            <p:nvPr/>
+          </p:nvSpPr>
+          <p:spPr>
+            <a:xfrm>
+              <a:off x="0" y="2418124"/>
+              <a:ext cx="4740752" cy="431691"/>
+            </a:xfrm>
+            <a:prstGeom prst="rect">
+              <a:avLst/>
+            </a:prstGeom>
+            <a:solidFill>
+              <a:schemeClr val="accent6">
+                <a:lumMod val="75000"/>
+              </a:schemeClr>
+            </a:solidFill>
+            <a:ln>
+              <a:solidFill>
+                <a:schemeClr val="tx1"/>
+              </a:solidFill>
+            </a:ln>
+          </p:spPr>
+          <p:style>
+            <a:lnRef idx="2">
+              <a:schemeClr val="accent1">
+                <a:shade val="50000"/>
+              </a:schemeClr>
+            </a:lnRef>
+            <a:fillRef idx="1">
+              <a:schemeClr val="accent1"/>
+            </a:fillRef>
+            <a:effectRef idx="0">
+              <a:schemeClr val="accent1"/>
+            </a:effectRef>
+            <a:fontRef idx="minor">
+              <a:schemeClr val="lt1"/>
+            </a:fontRef>
+          </p:style>
+          <p:txBody>
+            <a:bodyPr rtlCol="0" anchor="ctr"/>
+            <a:lstStyle/>
+            <a:p>
+              <a:pPr algn="ctr"/>
+              <a:endParaRPr lang="en-US"/>
+            </a:p>
+          </p:txBody>
+        </p:sp>
+        <p:sp>
+          <p:nvSpPr>
+            <p:cNvPr id="46" name="Rectangle 45"/>
+            <p:cNvSpPr/>
+            <p:nvPr/>
+          </p:nvSpPr>
+          <p:spPr>
+            <a:xfrm>
+              <a:off x="0" y="2134908"/>
+              <a:ext cx="4740752" cy="283216"/>
+            </a:xfrm>
+            <a:prstGeom prst="rect">
+              <a:avLst/>
+            </a:prstGeom>
+            <a:pattFill prst="wdUpDiag">
+              <a:fgClr>
+                <a:schemeClr val="accent6">
+                  <a:lumMod val="75000"/>
+                </a:schemeClr>
+              </a:fgClr>
+              <a:bgClr>
+                <a:schemeClr val="bg1"/>
+              </a:bgClr>
+            </a:pattFill>
+            <a:ln>
+              <a:solidFill>
+                <a:schemeClr val="tx1"/>
+              </a:solidFill>
+            </a:ln>
+          </p:spPr>
+          <p:style>
+            <a:lnRef idx="2">
+              <a:schemeClr val="accent1">
+                <a:shade val="50000"/>
+              </a:schemeClr>
+            </a:lnRef>
+            <a:fillRef idx="1">
+              <a:schemeClr val="accent1"/>
+            </a:fillRef>
+            <a:effectRef idx="0">
+              <a:schemeClr val="accent1"/>
+            </a:effectRef>
+            <a:fontRef idx="minor">
+              <a:schemeClr val="lt1"/>
+            </a:fontRef>
+          </p:style>
+          <p:txBody>
+            <a:bodyPr rtlCol="0" anchor="ctr"/>
+            <a:lstStyle/>
+            <a:p>
+              <a:pPr algn="ctr"/>
+              <a:endParaRPr lang="en-US"/>
+            </a:p>
+          </p:txBody>
+        </p:sp>
+      </p:grpSp>
+      <p:grpSp>
+        <p:nvGrpSpPr>
+          <p:cNvPr id="47" name="Group 46"/>
+          <p:cNvGrpSpPr/>
+          <p:nvPr/>
+        </p:nvGrpSpPr>
+        <p:grpSpPr>
+          <a:xfrm>
+            <a:off x="0" y="2284709"/>
+            <a:ext cx="4059936" cy="2286000"/>
+            <a:chOff x="0" y="3107"/>
+            <a:chExt cx="4740752" cy="2846708"/>
+          </a:xfrm>
+        </p:grpSpPr>
+        <p:sp>
+          <p:nvSpPr>
+            <p:cNvPr id="48" name="Rectangle 47"/>
+            <p:cNvSpPr/>
+            <p:nvPr/>
+          </p:nvSpPr>
+          <p:spPr>
+            <a:xfrm>
+              <a:off x="0" y="3107"/>
+              <a:ext cx="4740752" cy="2131801"/>
+            </a:xfrm>
+            <a:prstGeom prst="rect">
+              <a:avLst/>
+            </a:prstGeom>
+            <a:pattFill prst="pct90">
+              <a:fgClr>
+                <a:srgbClr val="996633"/>
+              </a:fgClr>
+              <a:bgClr>
+                <a:srgbClr val="663300"/>
+              </a:bgClr>
+            </a:pattFill>
+            <a:ln>
+              <a:solidFill>
+                <a:schemeClr val="tx1"/>
+              </a:solidFill>
+            </a:ln>
+          </p:spPr>
+          <p:style>
+            <a:lnRef idx="2">
+              <a:schemeClr val="accent1">
+                <a:shade val="50000"/>
+              </a:schemeClr>
+            </a:lnRef>
+            <a:fillRef idx="1">
+              <a:schemeClr val="accent1"/>
+            </a:fillRef>
+            <a:effectRef idx="0">
+              <a:schemeClr val="accent1"/>
+            </a:effectRef>
+            <a:fontRef idx="minor">
+              <a:schemeClr val="lt1"/>
+            </a:fontRef>
+          </p:style>
+          <p:txBody>
+            <a:bodyPr rtlCol="0" anchor="ctr"/>
+            <a:lstStyle/>
+            <a:p>
+              <a:pPr algn="ctr"/>
+              <a:endParaRPr lang="en-US"/>
+            </a:p>
+          </p:txBody>
+        </p:sp>
+        <p:sp>
+          <p:nvSpPr>
+            <p:cNvPr id="49" name="Rectangle 48"/>
+            <p:cNvSpPr/>
+            <p:nvPr/>
+          </p:nvSpPr>
+          <p:spPr>
+            <a:xfrm>
+              <a:off x="0" y="2418124"/>
+              <a:ext cx="4740752" cy="431691"/>
+            </a:xfrm>
+            <a:prstGeom prst="rect">
+              <a:avLst/>
+            </a:prstGeom>
+            <a:solidFill>
+              <a:srgbClr val="663300"/>
+            </a:solidFill>
+            <a:ln>
+              <a:solidFill>
+                <a:schemeClr val="tx1"/>
+              </a:solidFill>
+            </a:ln>
+          </p:spPr>
+          <p:style>
+            <a:lnRef idx="2">
+              <a:schemeClr val="accent1">
+                <a:shade val="50000"/>
+              </a:schemeClr>
+            </a:lnRef>
+            <a:fillRef idx="1">
+              <a:schemeClr val="accent1"/>
+            </a:fillRef>
+            <a:effectRef idx="0">
+              <a:schemeClr val="accent1"/>
+            </a:effectRef>
+            <a:fontRef idx="minor">
+              <a:schemeClr val="lt1"/>
+            </a:fontRef>
+          </p:style>
+          <p:txBody>
+            <a:bodyPr rtlCol="0" anchor="ctr"/>
+            <a:lstStyle/>
+            <a:p>
+              <a:pPr algn="ctr"/>
+              <a:endParaRPr lang="en-US"/>
+            </a:p>
+          </p:txBody>
+        </p:sp>
+        <p:sp>
+          <p:nvSpPr>
+            <p:cNvPr id="50" name="Rectangle 49"/>
+            <p:cNvSpPr/>
+            <p:nvPr/>
+          </p:nvSpPr>
+          <p:spPr>
+            <a:xfrm>
+              <a:off x="0" y="2134908"/>
+              <a:ext cx="4740752" cy="283216"/>
+            </a:xfrm>
+            <a:prstGeom prst="rect">
+              <a:avLst/>
+            </a:prstGeom>
+            <a:pattFill prst="wdUpDiag">
+              <a:fgClr>
+                <a:srgbClr val="663300"/>
+              </a:fgClr>
+              <a:bgClr>
+                <a:srgbClr val="CC9900"/>
+              </a:bgClr>
+            </a:pattFill>
+            <a:ln>
+              <a:solidFill>
+                <a:schemeClr val="tx1"/>
+              </a:solidFill>
+            </a:ln>
+          </p:spPr>
+          <p:style>
+            <a:lnRef idx="2">
+              <a:schemeClr val="accent1">
+                <a:shade val="50000"/>
+              </a:schemeClr>
+            </a:lnRef>
+            <a:fillRef idx="1">
+              <a:schemeClr val="accent1"/>
+            </a:fillRef>
+            <a:effectRef idx="0">
+              <a:schemeClr val="accent1"/>
+            </a:effectRef>
+            <a:fontRef idx="minor">
+              <a:schemeClr val="lt1"/>
+            </a:fontRef>
+          </p:style>
+          <p:txBody>
+            <a:bodyPr rtlCol="0" anchor="ctr"/>
+            <a:lstStyle/>
+            <a:p>
+              <a:pPr algn="ctr"/>
+              <a:endParaRPr lang="en-US"/>
+            </a:p>
+          </p:txBody>
+        </p:sp>
+      </p:grpSp>
+      <p:grpSp>
+        <p:nvGrpSpPr>
+          <p:cNvPr id="51" name="Group 50"/>
+          <p:cNvGrpSpPr/>
+          <p:nvPr/>
+        </p:nvGrpSpPr>
+        <p:grpSpPr>
+          <a:xfrm>
+            <a:off x="4066032" y="2284709"/>
+            <a:ext cx="4059936" cy="2286000"/>
+            <a:chOff x="0" y="3107"/>
+            <a:chExt cx="4740752" cy="2846708"/>
+          </a:xfrm>
+        </p:grpSpPr>
+        <p:sp>
+          <p:nvSpPr>
+            <p:cNvPr id="52" name="Rectangle 51"/>
+            <p:cNvSpPr/>
+            <p:nvPr/>
+          </p:nvSpPr>
+          <p:spPr>
+            <a:xfrm>
+              <a:off x="0" y="3107"/>
+              <a:ext cx="4740752" cy="2131801"/>
+            </a:xfrm>
+            <a:prstGeom prst="rect">
+              <a:avLst/>
+            </a:prstGeom>
+            <a:solidFill>
+              <a:schemeClr val="accent1">
+                <a:lumMod val="40000"/>
+                <a:lumOff val="60000"/>
+              </a:schemeClr>
+            </a:solidFill>
+            <a:ln>
+              <a:solidFill>
+                <a:schemeClr val="tx1"/>
+              </a:solidFill>
+            </a:ln>
+          </p:spPr>
+          <p:style>
+            <a:lnRef idx="2">
+              <a:schemeClr val="accent1">
+                <a:shade val="50000"/>
+              </a:schemeClr>
+            </a:lnRef>
+            <a:fillRef idx="1">
+              <a:schemeClr val="accent1"/>
+            </a:fillRef>
+            <a:effectRef idx="0">
+              <a:schemeClr val="accent1"/>
+            </a:effectRef>
+            <a:fontRef idx="minor">
+              <a:schemeClr val="lt1"/>
+            </a:fontRef>
+          </p:style>
+          <p:txBody>
+            <a:bodyPr rtlCol="0" anchor="ctr"/>
+            <a:lstStyle/>
+            <a:p>
+              <a:pPr algn="ctr"/>
+              <a:endParaRPr lang="en-US"/>
+            </a:p>
+          </p:txBody>
+        </p:sp>
+        <p:sp>
+          <p:nvSpPr>
+            <p:cNvPr id="53" name="Rectangle 52"/>
+            <p:cNvSpPr/>
+            <p:nvPr/>
+          </p:nvSpPr>
+          <p:spPr>
+            <a:xfrm>
+              <a:off x="0" y="2418124"/>
+              <a:ext cx="4740752" cy="431691"/>
+            </a:xfrm>
+            <a:prstGeom prst="rect">
+              <a:avLst/>
+            </a:prstGeom>
+            <a:solidFill>
+              <a:schemeClr val="accent6"/>
+            </a:solidFill>
+            <a:ln>
+              <a:solidFill>
+                <a:schemeClr val="tx1"/>
+              </a:solidFill>
+            </a:ln>
+          </p:spPr>
+          <p:style>
+            <a:lnRef idx="2">
+              <a:schemeClr val="accent1">
+                <a:shade val="50000"/>
+              </a:schemeClr>
+            </a:lnRef>
+            <a:fillRef idx="1">
+              <a:schemeClr val="accent1"/>
+            </a:fillRef>
+            <a:effectRef idx="0">
+              <a:schemeClr val="accent1"/>
+            </a:effectRef>
+            <a:fontRef idx="minor">
+              <a:schemeClr val="lt1"/>
+            </a:fontRef>
+          </p:style>
+          <p:txBody>
+            <a:bodyPr rtlCol="0" anchor="ctr"/>
+            <a:lstStyle/>
+            <a:p>
+              <a:pPr algn="ctr"/>
+              <a:endParaRPr lang="en-US"/>
+            </a:p>
+          </p:txBody>
+        </p:sp>
+        <p:sp>
+          <p:nvSpPr>
+            <p:cNvPr id="54" name="Rectangle 53"/>
+            <p:cNvSpPr/>
+            <p:nvPr/>
+          </p:nvSpPr>
+          <p:spPr>
+            <a:xfrm>
+              <a:off x="0" y="2134908"/>
+              <a:ext cx="4740752" cy="283216"/>
+            </a:xfrm>
+            <a:prstGeom prst="rect">
+              <a:avLst/>
+            </a:prstGeom>
+            <a:pattFill prst="wdUpDiag">
+              <a:fgClr>
+                <a:schemeClr val="accent6"/>
+              </a:fgClr>
+              <a:bgClr>
+                <a:schemeClr val="bg1"/>
+              </a:bgClr>
+            </a:pattFill>
+            <a:ln>
+              <a:solidFill>
+                <a:schemeClr val="tx1"/>
+              </a:solidFill>
+            </a:ln>
+          </p:spPr>
+          <p:style>
+            <a:lnRef idx="2">
+              <a:schemeClr val="accent1">
+                <a:shade val="50000"/>
+              </a:schemeClr>
+            </a:lnRef>
+            <a:fillRef idx="1">
+              <a:schemeClr val="accent1"/>
+            </a:fillRef>
+            <a:effectRef idx="0">
+              <a:schemeClr val="accent1"/>
+            </a:effectRef>
+            <a:fontRef idx="minor">
+              <a:schemeClr val="lt1"/>
+            </a:fontRef>
+          </p:style>
+          <p:txBody>
+            <a:bodyPr rtlCol="0" anchor="ctr"/>
+            <a:lstStyle/>
+            <a:p>
+              <a:pPr algn="ctr"/>
+              <a:endParaRPr lang="en-US"/>
+            </a:p>
+          </p:txBody>
+        </p:sp>
+      </p:grpSp>
+      <p:grpSp>
+        <p:nvGrpSpPr>
+          <p:cNvPr id="55" name="Group 54"/>
+          <p:cNvGrpSpPr/>
+          <p:nvPr/>
+        </p:nvGrpSpPr>
+        <p:grpSpPr>
+          <a:xfrm>
+            <a:off x="8132064" y="2284709"/>
+            <a:ext cx="4059936" cy="2286000"/>
+            <a:chOff x="0" y="3107"/>
+            <a:chExt cx="4740752" cy="2846708"/>
+          </a:xfrm>
+        </p:grpSpPr>
+        <p:sp>
+          <p:nvSpPr>
+            <p:cNvPr id="56" name="Rectangle 55"/>
+            <p:cNvSpPr/>
+            <p:nvPr/>
+          </p:nvSpPr>
+          <p:spPr>
+            <a:xfrm>
+              <a:off x="0" y="3107"/>
+              <a:ext cx="4740752" cy="2131801"/>
+            </a:xfrm>
+            <a:prstGeom prst="rect">
+              <a:avLst/>
+            </a:prstGeom>
+            <a:solidFill>
+              <a:schemeClr val="accent1">
+                <a:lumMod val="40000"/>
+                <a:lumOff val="60000"/>
+              </a:schemeClr>
+            </a:solidFill>
+            <a:ln>
+              <a:solidFill>
+                <a:schemeClr val="tx1"/>
+              </a:solidFill>
+            </a:ln>
+          </p:spPr>
+          <p:style>
+            <a:lnRef idx="2">
+              <a:schemeClr val="accent1">
+                <a:shade val="50000"/>
+              </a:schemeClr>
+            </a:lnRef>
+            <a:fillRef idx="1">
+              <a:schemeClr val="accent1"/>
+            </a:fillRef>
+            <a:effectRef idx="0">
+              <a:schemeClr val="accent1"/>
+            </a:effectRef>
+            <a:fontRef idx="minor">
+              <a:schemeClr val="lt1"/>
+            </a:fontRef>
+          </p:style>
+          <p:txBody>
+            <a:bodyPr rtlCol="0" anchor="ctr"/>
+            <a:lstStyle/>
+            <a:p>
+              <a:pPr algn="ctr"/>
+              <a:endParaRPr lang="en-US"/>
+            </a:p>
+          </p:txBody>
+        </p:sp>
+        <p:sp>
+          <p:nvSpPr>
+            <p:cNvPr id="57" name="Rectangle 56"/>
+            <p:cNvSpPr/>
+            <p:nvPr/>
+          </p:nvSpPr>
+          <p:spPr>
+            <a:xfrm>
+              <a:off x="0" y="2418124"/>
+              <a:ext cx="4740752" cy="431691"/>
+            </a:xfrm>
+            <a:prstGeom prst="rect">
+              <a:avLst/>
+            </a:prstGeom>
+            <a:solidFill>
+              <a:schemeClr val="accent6"/>
+            </a:solidFill>
+            <a:ln>
+              <a:solidFill>
+                <a:schemeClr val="tx1"/>
+              </a:solidFill>
+            </a:ln>
+          </p:spPr>
+          <p:style>
+            <a:lnRef idx="2">
+              <a:schemeClr val="accent1">
+                <a:shade val="50000"/>
+              </a:schemeClr>
+            </a:lnRef>
+            <a:fillRef idx="1">
+              <a:schemeClr val="accent1"/>
+            </a:fillRef>
+            <a:effectRef idx="0">
+              <a:schemeClr val="accent1"/>
+            </a:effectRef>
+            <a:fontRef idx="minor">
+              <a:schemeClr val="lt1"/>
+            </a:fontRef>
+          </p:style>
+          <p:txBody>
+            <a:bodyPr rtlCol="0" anchor="ctr"/>
+            <a:lstStyle/>
+            <a:p>
+              <a:pPr algn="ctr"/>
+              <a:endParaRPr lang="en-US"/>
+            </a:p>
+          </p:txBody>
+        </p:sp>
+        <p:sp>
+          <p:nvSpPr>
+            <p:cNvPr id="58" name="Rectangle 57"/>
+            <p:cNvSpPr/>
+            <p:nvPr/>
+          </p:nvSpPr>
+          <p:spPr>
+            <a:xfrm>
+              <a:off x="0" y="2134908"/>
+              <a:ext cx="4740752" cy="283216"/>
+            </a:xfrm>
+            <a:prstGeom prst="rect">
+              <a:avLst/>
+            </a:prstGeom>
+            <a:pattFill prst="wdUpDiag">
+              <a:fgClr>
+                <a:schemeClr val="accent6"/>
+              </a:fgClr>
+              <a:bgClr>
+                <a:schemeClr val="bg1"/>
+              </a:bgClr>
+            </a:pattFill>
+            <a:ln>
+              <a:solidFill>
+                <a:schemeClr val="tx1"/>
+              </a:solidFill>
+            </a:ln>
+          </p:spPr>
+          <p:style>
+            <a:lnRef idx="2">
+              <a:schemeClr val="accent1">
+                <a:shade val="50000"/>
+              </a:schemeClr>
+            </a:lnRef>
+            <a:fillRef idx="1">
+              <a:schemeClr val="accent1"/>
+            </a:fillRef>
+            <a:effectRef idx="0">
+              <a:schemeClr val="accent1"/>
+            </a:effectRef>
+            <a:fontRef idx="minor">
+              <a:schemeClr val="lt1"/>
+            </a:fontRef>
+          </p:style>
+          <p:txBody>
+            <a:bodyPr rtlCol="0" anchor="ctr"/>
+            <a:lstStyle/>
+            <a:p>
+              <a:pPr algn="ctr"/>
+              <a:endParaRPr lang="en-US"/>
+            </a:p>
+          </p:txBody>
+        </p:sp>
+      </p:grpSp>
+      <p:grpSp>
+        <p:nvGrpSpPr>
+          <p:cNvPr id="59" name="Group 58"/>
+          <p:cNvGrpSpPr/>
+          <p:nvPr/>
+        </p:nvGrpSpPr>
+        <p:grpSpPr>
+          <a:xfrm>
+            <a:off x="0" y="4565521"/>
+            <a:ext cx="4059936" cy="2286000"/>
+            <a:chOff x="0" y="3107"/>
+            <a:chExt cx="4740752" cy="2846708"/>
+          </a:xfrm>
+        </p:grpSpPr>
+        <p:sp>
+          <p:nvSpPr>
+            <p:cNvPr id="60" name="Rectangle 59"/>
+            <p:cNvSpPr/>
+            <p:nvPr/>
+          </p:nvSpPr>
+          <p:spPr>
+            <a:xfrm>
+              <a:off x="0" y="3107"/>
+              <a:ext cx="4740752" cy="2131801"/>
+            </a:xfrm>
+            <a:prstGeom prst="rect">
+              <a:avLst/>
+            </a:prstGeom>
+            <a:solidFill>
+              <a:schemeClr val="accent1">
+                <a:lumMod val="40000"/>
+                <a:lumOff val="60000"/>
+              </a:schemeClr>
+            </a:solidFill>
+            <a:ln>
+              <a:solidFill>
+                <a:schemeClr val="tx1"/>
+              </a:solidFill>
+            </a:ln>
+          </p:spPr>
+          <p:style>
+            <a:lnRef idx="2">
+              <a:schemeClr val="accent1">
+                <a:shade val="50000"/>
+              </a:schemeClr>
+            </a:lnRef>
+            <a:fillRef idx="1">
+              <a:schemeClr val="accent1"/>
+            </a:fillRef>
+            <a:effectRef idx="0">
+              <a:schemeClr val="accent1"/>
+            </a:effectRef>
+            <a:fontRef idx="minor">
+              <a:schemeClr val="lt1"/>
+            </a:fontRef>
+          </p:style>
+          <p:txBody>
+            <a:bodyPr rtlCol="0" anchor="ctr"/>
+            <a:lstStyle/>
+            <a:p>
+              <a:pPr algn="ctr"/>
+              <a:endParaRPr lang="en-US"/>
+            </a:p>
+          </p:txBody>
+        </p:sp>
+        <p:sp>
+          <p:nvSpPr>
+            <p:cNvPr id="61" name="Rectangle 60"/>
+            <p:cNvSpPr/>
+            <p:nvPr/>
+          </p:nvSpPr>
+          <p:spPr>
+            <a:xfrm>
+              <a:off x="0" y="2418124"/>
+              <a:ext cx="4740752" cy="431691"/>
+            </a:xfrm>
+            <a:prstGeom prst="rect">
+              <a:avLst/>
+            </a:prstGeom>
+            <a:solidFill>
+              <a:schemeClr val="accent6"/>
+            </a:solidFill>
+            <a:ln>
+              <a:solidFill>
+                <a:schemeClr val="tx1"/>
+              </a:solidFill>
+            </a:ln>
+          </p:spPr>
+          <p:style>
+            <a:lnRef idx="2">
+              <a:schemeClr val="accent1">
+                <a:shade val="50000"/>
+              </a:schemeClr>
+            </a:lnRef>
+            <a:fillRef idx="1">
+              <a:schemeClr val="accent1"/>
+            </a:fillRef>
+            <a:effectRef idx="0">
+              <a:schemeClr val="accent1"/>
+            </a:effectRef>
+            <a:fontRef idx="minor">
+              <a:schemeClr val="lt1"/>
+            </a:fontRef>
+          </p:style>
+          <p:txBody>
+            <a:bodyPr rtlCol="0" anchor="ctr"/>
+            <a:lstStyle/>
+            <a:p>
+              <a:pPr algn="ctr"/>
+              <a:endParaRPr lang="en-US"/>
+            </a:p>
+          </p:txBody>
+        </p:sp>
+        <p:sp>
+          <p:nvSpPr>
+            <p:cNvPr id="62" name="Rectangle 61"/>
+            <p:cNvSpPr/>
+            <p:nvPr/>
+          </p:nvSpPr>
+          <p:spPr>
+            <a:xfrm>
+              <a:off x="0" y="2134908"/>
+              <a:ext cx="4740752" cy="283216"/>
+            </a:xfrm>
+            <a:prstGeom prst="rect">
+              <a:avLst/>
+            </a:prstGeom>
+            <a:pattFill prst="wdUpDiag">
+              <a:fgClr>
+                <a:schemeClr val="accent6"/>
+              </a:fgClr>
+              <a:bgClr>
+                <a:schemeClr val="bg1"/>
+              </a:bgClr>
+            </a:pattFill>
+            <a:ln>
+              <a:solidFill>
+                <a:schemeClr val="tx1"/>
+              </a:solidFill>
+            </a:ln>
+          </p:spPr>
+          <p:style>
+            <a:lnRef idx="2">
+              <a:schemeClr val="accent1">
+                <a:shade val="50000"/>
+              </a:schemeClr>
+            </a:lnRef>
+            <a:fillRef idx="1">
+              <a:schemeClr val="accent1"/>
+            </a:fillRef>
+            <a:effectRef idx="0">
+              <a:schemeClr val="accent1"/>
+            </a:effectRef>
+            <a:fontRef idx="minor">
+              <a:schemeClr val="lt1"/>
+            </a:fontRef>
+          </p:style>
+          <p:txBody>
+            <a:bodyPr rtlCol="0" anchor="ctr"/>
+            <a:lstStyle/>
+            <a:p>
+              <a:pPr algn="ctr"/>
+              <a:endParaRPr lang="en-US"/>
+            </a:p>
+          </p:txBody>
+        </p:sp>
+      </p:grpSp>
+      <p:grpSp>
+        <p:nvGrpSpPr>
+          <p:cNvPr id="63" name="Group 62"/>
+          <p:cNvGrpSpPr/>
+          <p:nvPr/>
+        </p:nvGrpSpPr>
+        <p:grpSpPr>
+          <a:xfrm>
+            <a:off x="4066032" y="4565521"/>
+            <a:ext cx="4059936" cy="2286000"/>
+            <a:chOff x="0" y="3107"/>
+            <a:chExt cx="4740752" cy="2846708"/>
+          </a:xfrm>
+        </p:grpSpPr>
+        <p:sp>
+          <p:nvSpPr>
+            <p:cNvPr id="64" name="Rectangle 63"/>
+            <p:cNvSpPr/>
+            <p:nvPr/>
+          </p:nvSpPr>
+          <p:spPr>
+            <a:xfrm>
+              <a:off x="0" y="3107"/>
+              <a:ext cx="4740752" cy="2131801"/>
+            </a:xfrm>
+            <a:prstGeom prst="rect">
+              <a:avLst/>
+            </a:prstGeom>
+            <a:solidFill>
+              <a:schemeClr val="accent1">
+                <a:lumMod val="40000"/>
+                <a:lumOff val="60000"/>
+              </a:schemeClr>
+            </a:solidFill>
+            <a:ln>
+              <a:solidFill>
+                <a:schemeClr val="tx1"/>
+              </a:solidFill>
+            </a:ln>
+          </p:spPr>
+          <p:style>
+            <a:lnRef idx="2">
+              <a:schemeClr val="accent1">
+                <a:shade val="50000"/>
+              </a:schemeClr>
+            </a:lnRef>
+            <a:fillRef idx="1">
+              <a:schemeClr val="accent1"/>
+            </a:fillRef>
+            <a:effectRef idx="0">
+              <a:schemeClr val="accent1"/>
+            </a:effectRef>
+            <a:fontRef idx="minor">
+              <a:schemeClr val="lt1"/>
+            </a:fontRef>
+          </p:style>
+          <p:txBody>
+            <a:bodyPr rtlCol="0" anchor="ctr"/>
+            <a:lstStyle/>
+            <a:p>
+              <a:pPr algn="ctr"/>
+              <a:endParaRPr lang="en-US"/>
+            </a:p>
+          </p:txBody>
+        </p:sp>
+        <p:sp>
+          <p:nvSpPr>
+            <p:cNvPr id="65" name="Rectangle 64"/>
+            <p:cNvSpPr/>
+            <p:nvPr/>
+          </p:nvSpPr>
+          <p:spPr>
+            <a:xfrm>
+              <a:off x="0" y="2418124"/>
+              <a:ext cx="4740752" cy="431691"/>
+            </a:xfrm>
+            <a:prstGeom prst="rect">
+              <a:avLst/>
+            </a:prstGeom>
+            <a:solidFill>
+              <a:schemeClr val="accent6"/>
+            </a:solidFill>
+            <a:ln>
+              <a:solidFill>
+                <a:schemeClr val="tx1"/>
+              </a:solidFill>
+            </a:ln>
+          </p:spPr>
+          <p:style>
+            <a:lnRef idx="2">
+              <a:schemeClr val="accent1">
+                <a:shade val="50000"/>
+              </a:schemeClr>
+            </a:lnRef>
+            <a:fillRef idx="1">
+              <a:schemeClr val="accent1"/>
+            </a:fillRef>
+            <a:effectRef idx="0">
+              <a:schemeClr val="accent1"/>
+            </a:effectRef>
+            <a:fontRef idx="minor">
+              <a:schemeClr val="lt1"/>
+            </a:fontRef>
+          </p:style>
+          <p:txBody>
+            <a:bodyPr rtlCol="0" anchor="ctr"/>
+            <a:lstStyle/>
+            <a:p>
+              <a:pPr algn="ctr"/>
+              <a:endParaRPr lang="en-US"/>
+            </a:p>
+          </p:txBody>
+        </p:sp>
+        <p:sp>
+          <p:nvSpPr>
+            <p:cNvPr id="66" name="Rectangle 65"/>
+            <p:cNvSpPr/>
+            <p:nvPr/>
+          </p:nvSpPr>
+          <p:spPr>
+            <a:xfrm>
+              <a:off x="0" y="2134908"/>
+              <a:ext cx="4740752" cy="283216"/>
+            </a:xfrm>
+            <a:prstGeom prst="rect">
+              <a:avLst/>
+            </a:prstGeom>
+            <a:pattFill prst="wdUpDiag">
+              <a:fgClr>
+                <a:schemeClr val="accent6"/>
+              </a:fgClr>
+              <a:bgClr>
+                <a:schemeClr val="bg1"/>
+              </a:bgClr>
+            </a:pattFill>
+            <a:ln>
+              <a:solidFill>
+                <a:schemeClr val="tx1"/>
+              </a:solidFill>
+            </a:ln>
+          </p:spPr>
+          <p:style>
+            <a:lnRef idx="2">
+              <a:schemeClr val="accent1">
+                <a:shade val="50000"/>
+              </a:schemeClr>
+            </a:lnRef>
+            <a:fillRef idx="1">
+              <a:schemeClr val="accent1"/>
+            </a:fillRef>
+            <a:effectRef idx="0">
+              <a:schemeClr val="accent1"/>
+            </a:effectRef>
+            <a:fontRef idx="minor">
+              <a:schemeClr val="lt1"/>
+            </a:fontRef>
+          </p:style>
+          <p:txBody>
+            <a:bodyPr rtlCol="0" anchor="ctr"/>
+            <a:lstStyle/>
+            <a:p>
+              <a:pPr algn="ctr"/>
+              <a:endParaRPr lang="en-US"/>
+            </a:p>
+          </p:txBody>
+        </p:sp>
+      </p:grpSp>
+      <p:grpSp>
+        <p:nvGrpSpPr>
+          <p:cNvPr id="67" name="Group 66"/>
+          <p:cNvGrpSpPr/>
+          <p:nvPr/>
+        </p:nvGrpSpPr>
+        <p:grpSpPr>
+          <a:xfrm>
+            <a:off x="8132064" y="4565521"/>
+            <a:ext cx="4059936" cy="2286000"/>
+            <a:chOff x="0" y="3107"/>
+            <a:chExt cx="4740752" cy="2846708"/>
+          </a:xfrm>
+        </p:grpSpPr>
+        <p:sp>
+          <p:nvSpPr>
+            <p:cNvPr id="68" name="Rectangle 67"/>
+            <p:cNvSpPr/>
+            <p:nvPr/>
+          </p:nvSpPr>
+          <p:spPr>
+            <a:xfrm>
+              <a:off x="0" y="3107"/>
+              <a:ext cx="4740752" cy="2131801"/>
+            </a:xfrm>
+            <a:prstGeom prst="rect">
+              <a:avLst/>
+            </a:prstGeom>
+            <a:solidFill>
+              <a:schemeClr val="accent1">
+                <a:lumMod val="40000"/>
+                <a:lumOff val="60000"/>
+              </a:schemeClr>
+            </a:solidFill>
+            <a:ln>
+              <a:solidFill>
+                <a:schemeClr val="tx1"/>
+              </a:solidFill>
+            </a:ln>
+          </p:spPr>
+          <p:style>
+            <a:lnRef idx="2">
+              <a:schemeClr val="accent1">
+                <a:shade val="50000"/>
+              </a:schemeClr>
+            </a:lnRef>
+            <a:fillRef idx="1">
+              <a:schemeClr val="accent1"/>
+            </a:fillRef>
+            <a:effectRef idx="0">
+              <a:schemeClr val="accent1"/>
+            </a:effectRef>
+            <a:fontRef idx="minor">
+              <a:schemeClr val="lt1"/>
+            </a:fontRef>
+          </p:style>
+          <p:txBody>
+            <a:bodyPr rtlCol="0" anchor="ctr"/>
+            <a:lstStyle/>
+            <a:p>
+              <a:pPr algn="ctr"/>
+              <a:endParaRPr lang="en-US"/>
+            </a:p>
+          </p:txBody>
+        </p:sp>
+        <p:sp>
+          <p:nvSpPr>
+            <p:cNvPr id="69" name="Rectangle 68"/>
+            <p:cNvSpPr/>
+            <p:nvPr/>
+          </p:nvSpPr>
+          <p:spPr>
+            <a:xfrm>
+              <a:off x="0" y="2418124"/>
+              <a:ext cx="4740752" cy="431691"/>
+            </a:xfrm>
+            <a:prstGeom prst="rect">
+              <a:avLst/>
+            </a:prstGeom>
+            <a:solidFill>
+              <a:schemeClr val="accent6"/>
+            </a:solidFill>
+            <a:ln>
+              <a:solidFill>
+                <a:schemeClr val="tx1"/>
+              </a:solidFill>
+            </a:ln>
+          </p:spPr>
+          <p:style>
+            <a:lnRef idx="2">
+              <a:schemeClr val="accent1">
+                <a:shade val="50000"/>
+              </a:schemeClr>
+            </a:lnRef>
+            <a:fillRef idx="1">
+              <a:schemeClr val="accent1"/>
+            </a:fillRef>
+            <a:effectRef idx="0">
+              <a:schemeClr val="accent1"/>
+            </a:effectRef>
+            <a:fontRef idx="minor">
+              <a:schemeClr val="lt1"/>
+            </a:fontRef>
+          </p:style>
+          <p:txBody>
+            <a:bodyPr rtlCol="0" anchor="ctr"/>
+            <a:lstStyle/>
+            <a:p>
+              <a:pPr algn="ctr"/>
+              <a:endParaRPr lang="en-US"/>
+            </a:p>
+          </p:txBody>
+        </p:sp>
+        <p:sp>
+          <p:nvSpPr>
+            <p:cNvPr id="70" name="Rectangle 69"/>
+            <p:cNvSpPr/>
+            <p:nvPr/>
+          </p:nvSpPr>
+          <p:spPr>
+            <a:xfrm>
+              <a:off x="0" y="2134908"/>
+              <a:ext cx="4740752" cy="283216"/>
+            </a:xfrm>
+            <a:prstGeom prst="rect">
+              <a:avLst/>
+            </a:prstGeom>
+            <a:pattFill prst="wdUpDiag">
+              <a:fgClr>
+                <a:schemeClr val="accent6"/>
+              </a:fgClr>
+              <a:bgClr>
+                <a:schemeClr val="bg1"/>
+              </a:bgClr>
+            </a:pattFill>
+            <a:ln>
+              <a:solidFill>
+                <a:schemeClr val="tx1"/>
+              </a:solidFill>
+            </a:ln>
+          </p:spPr>
+          <p:style>
+            <a:lnRef idx="2">
+              <a:schemeClr val="accent1">
+                <a:shade val="50000"/>
+              </a:schemeClr>
+            </a:lnRef>
+            <a:fillRef idx="1">
+              <a:schemeClr val="accent1"/>
+            </a:fillRef>
+            <a:effectRef idx="0">
+              <a:schemeClr val="accent1"/>
+            </a:effectRef>
+            <a:fontRef idx="minor">
+              <a:schemeClr val="lt1"/>
+            </a:fontRef>
+          </p:style>
+          <p:txBody>
+            <a:bodyPr rtlCol="0" anchor="ctr"/>
+            <a:lstStyle/>
+            <a:p>
+              <a:pPr algn="ctr"/>
+              <a:endParaRPr lang="en-US"/>
+            </a:p>
+          </p:txBody>
+        </p:sp>
+      </p:grpSp>
+      <p:sp>
+        <p:nvSpPr>
+          <p:cNvPr id="4" name="TextBox 3"/>
+          <p:cNvSpPr txBox="1"/>
+          <p:nvPr/>
+        </p:nvSpPr>
+        <p:spPr>
+          <a:xfrm>
+            <a:off x="153055" y="72991"/>
+            <a:ext cx="3695045" cy="338554"/>
+          </a:xfrm>
+          <a:prstGeom prst="rect">
+            <a:avLst/>
+          </a:prstGeom>
+          <a:noFill/>
+        </p:spPr>
+        <p:txBody>
+          <a:bodyPr wrap="square" rtlCol="0">
+            <a:spAutoFit/>
+          </a:bodyPr>
           <a:lstStyle/>
           <a:p>
-            <a:endParaRPr lang="en-US"/>
-          </a:p>
-        </p:txBody>
-      </p:sp>
-      <p:sp>
-        <p:nvSpPr>
-          <p:cNvPr id="3" name="Subtitle 2"/>
-          <p:cNvSpPr>
-            <a:spLocks noGrp="1"/>
-          </p:cNvSpPr>
-          <p:nvPr>
-            <p:ph type="subTitle" idx="1"/>
-          </p:nvPr>
-        </p:nvSpPr>
-        <p:spPr/>
-        <p:txBody>
-          <a:bodyPr/>
+            <a:r>
+              <a:rPr lang="en-US" sz="1600" dirty="0" smtClean="0">
+                <a:latin typeface="Comic Sans MS" panose="030F0702030302020204" pitchFamily="66" charset="0"/>
+              </a:rPr>
+              <a:t>Welcome, to the New World!</a:t>
+            </a:r>
+          </a:p>
+        </p:txBody>
+      </p:sp>
+      <p:grpSp>
+        <p:nvGrpSpPr>
+          <p:cNvPr id="7" name="Group 6"/>
+          <p:cNvGrpSpPr/>
+          <p:nvPr/>
+        </p:nvGrpSpPr>
+        <p:grpSpPr>
+          <a:xfrm>
+            <a:off x="259504" y="1267498"/>
+            <a:ext cx="365760" cy="548640"/>
+            <a:chOff x="961494" y="1216584"/>
+            <a:chExt cx="643612" cy="690705"/>
+          </a:xfrm>
+        </p:grpSpPr>
+        <p:sp>
+          <p:nvSpPr>
+            <p:cNvPr id="5" name="Rectangle 4"/>
+            <p:cNvSpPr/>
+            <p:nvPr/>
+          </p:nvSpPr>
+          <p:spPr>
+            <a:xfrm>
+              <a:off x="961494" y="1216584"/>
+              <a:ext cx="643612" cy="690705"/>
+            </a:xfrm>
+            <a:prstGeom prst="rect">
+              <a:avLst/>
+            </a:prstGeom>
+            <a:solidFill>
+              <a:srgbClr val="0070C0"/>
+            </a:solidFill>
+            <a:ln>
+              <a:solidFill>
+                <a:schemeClr val="tx1"/>
+              </a:solidFill>
+            </a:ln>
+          </p:spPr>
+          <p:style>
+            <a:lnRef idx="2">
+              <a:schemeClr val="accent1">
+                <a:shade val="50000"/>
+              </a:schemeClr>
+            </a:lnRef>
+            <a:fillRef idx="1">
+              <a:schemeClr val="accent1"/>
+            </a:fillRef>
+            <a:effectRef idx="0">
+              <a:schemeClr val="accent1"/>
+            </a:effectRef>
+            <a:fontRef idx="minor">
+              <a:schemeClr val="lt1"/>
+            </a:fontRef>
+          </p:style>
+          <p:txBody>
+            <a:bodyPr rtlCol="0" anchor="ctr"/>
+            <a:lstStyle/>
+            <a:p>
+              <a:pPr algn="ctr"/>
+              <a:endParaRPr lang="en-US"/>
+            </a:p>
+          </p:txBody>
+        </p:sp>
+        <p:sp>
+          <p:nvSpPr>
+            <p:cNvPr id="6" name="Rectangle 5"/>
+            <p:cNvSpPr/>
+            <p:nvPr/>
+          </p:nvSpPr>
+          <p:spPr>
+            <a:xfrm>
+              <a:off x="1213313" y="1342709"/>
+              <a:ext cx="391793" cy="195569"/>
+            </a:xfrm>
+            <a:prstGeom prst="rect">
+              <a:avLst/>
+            </a:prstGeom>
+            <a:solidFill>
+              <a:schemeClr val="tx1"/>
+            </a:solidFill>
+            <a:ln>
+              <a:solidFill>
+                <a:schemeClr val="tx1"/>
+              </a:solidFill>
+            </a:ln>
+          </p:spPr>
+          <p:style>
+            <a:lnRef idx="2">
+              <a:schemeClr val="accent1">
+                <a:shade val="50000"/>
+              </a:schemeClr>
+            </a:lnRef>
+            <a:fillRef idx="1">
+              <a:schemeClr val="accent1"/>
+            </a:fillRef>
+            <a:effectRef idx="0">
+              <a:schemeClr val="accent1"/>
+            </a:effectRef>
+            <a:fontRef idx="minor">
+              <a:schemeClr val="lt1"/>
+            </a:fontRef>
+          </p:style>
+          <p:txBody>
+            <a:bodyPr rtlCol="0" anchor="ctr"/>
+            <a:lstStyle/>
+            <a:p>
+              <a:pPr algn="ctr"/>
+              <a:endParaRPr lang="en-US"/>
+            </a:p>
+          </p:txBody>
+        </p:sp>
+      </p:grpSp>
+      <p:sp>
+        <p:nvSpPr>
+          <p:cNvPr id="25" name="TextBox 24"/>
+          <p:cNvSpPr txBox="1"/>
+          <p:nvPr/>
+        </p:nvSpPr>
+        <p:spPr>
+          <a:xfrm>
+            <a:off x="884768" y="792283"/>
+            <a:ext cx="2747432" cy="215444"/>
+          </a:xfrm>
+          <a:prstGeom prst="rect">
+            <a:avLst/>
+          </a:prstGeom>
+          <a:solidFill>
+            <a:srgbClr val="CC9900"/>
+          </a:solidFill>
+        </p:spPr>
+        <p:txBody>
+          <a:bodyPr wrap="square" rtlCol="0">
+            <a:spAutoFit/>
+          </a:bodyPr>
           <a:lstStyle/>
           <a:p>
-            <a:endParaRPr lang="en-US"/>
-          </a:p>
-        </p:txBody>
-      </p:sp>
+            <a:r>
+              <a:rPr lang="en-US" sz="800" dirty="0" smtClean="0">
+                <a:latin typeface="Comic Sans MS" panose="030F0702030302020204" pitchFamily="66" charset="0"/>
+              </a:rPr>
+              <a:t>Begin your travel to finding a place to stay at.</a:t>
+            </a:r>
+          </a:p>
+        </p:txBody>
+      </p:sp>
+      <p:sp>
+        <p:nvSpPr>
+          <p:cNvPr id="26" name="TextBox 25"/>
+          <p:cNvSpPr txBox="1"/>
+          <p:nvPr/>
+        </p:nvSpPr>
+        <p:spPr>
+          <a:xfrm>
+            <a:off x="884768" y="1173470"/>
+            <a:ext cx="2544233" cy="215444"/>
+          </a:xfrm>
+          <a:prstGeom prst="rect">
+            <a:avLst/>
+          </a:prstGeom>
+          <a:solidFill>
+            <a:srgbClr val="CC9900"/>
+          </a:solidFill>
+        </p:spPr>
+        <p:txBody>
+          <a:bodyPr wrap="square" rtlCol="0">
+            <a:spAutoFit/>
+          </a:bodyPr>
+          <a:lstStyle/>
+          <a:p>
+            <a:r>
+              <a:rPr lang="en-US" sz="800" dirty="0">
+                <a:latin typeface="Comic Sans MS" panose="030F0702030302020204" pitchFamily="66" charset="0"/>
+              </a:rPr>
+              <a:t>S</a:t>
+            </a:r>
+            <a:r>
+              <a:rPr lang="en-US" sz="800" dirty="0" smtClean="0">
+                <a:latin typeface="Comic Sans MS" panose="030F0702030302020204" pitchFamily="66" charset="0"/>
+              </a:rPr>
+              <a:t>ay nah I am not playing this game. (Exit Game)</a:t>
+            </a:r>
+          </a:p>
+        </p:txBody>
+      </p:sp>
+      <p:sp>
+        <p:nvSpPr>
+          <p:cNvPr id="15" name="Rounded Rectangle 14"/>
+          <p:cNvSpPr/>
+          <p:nvPr/>
+        </p:nvSpPr>
+        <p:spPr>
+          <a:xfrm>
+            <a:off x="3299460" y="766854"/>
+            <a:ext cx="548640" cy="274713"/>
+          </a:xfrm>
+          <a:prstGeom prst="roundRect">
+            <a:avLst/>
+          </a:prstGeom>
+          <a:solidFill>
+            <a:schemeClr val="accent3"/>
+          </a:solidFill>
+          <a:ln>
+            <a:solidFill>
+              <a:schemeClr val="tx1"/>
+            </a:solidFill>
+          </a:ln>
+        </p:spPr>
+        <p:style>
+          <a:lnRef idx="2">
+            <a:schemeClr val="accent1">
+              <a:shade val="50000"/>
+            </a:schemeClr>
+          </a:lnRef>
+          <a:fillRef idx="1">
+            <a:schemeClr val="accent1"/>
+          </a:fillRef>
+          <a:effectRef idx="0">
+            <a:schemeClr val="accent1"/>
+          </a:effectRef>
+          <a:fontRef idx="minor">
+            <a:schemeClr val="lt1"/>
+          </a:fontRef>
+        </p:style>
+        <p:txBody>
+          <a:bodyPr rtlCol="0" anchor="ctr"/>
+          <a:lstStyle/>
+          <a:p>
+            <a:pPr algn="ctr"/>
+            <a:r>
+              <a:rPr lang="en-US" sz="1000" dirty="0" smtClean="0">
+                <a:solidFill>
+                  <a:schemeClr val="tx1"/>
+                </a:solidFill>
+              </a:rPr>
+              <a:t>Start</a:t>
+            </a:r>
+            <a:endParaRPr lang="en-US" sz="1000" dirty="0">
+              <a:solidFill>
+                <a:schemeClr val="tx1"/>
+              </a:solidFill>
+            </a:endParaRPr>
+          </a:p>
+        </p:txBody>
+      </p:sp>
+      <p:sp>
+        <p:nvSpPr>
+          <p:cNvPr id="16" name="Rounded Rectangle 15"/>
+          <p:cNvSpPr/>
+          <p:nvPr/>
+        </p:nvSpPr>
+        <p:spPr>
+          <a:xfrm>
+            <a:off x="3299460" y="1131613"/>
+            <a:ext cx="548640" cy="274713"/>
+          </a:xfrm>
+          <a:prstGeom prst="roundRect">
+            <a:avLst/>
+          </a:prstGeom>
+          <a:solidFill>
+            <a:schemeClr val="accent3"/>
+          </a:solidFill>
+          <a:ln>
+            <a:solidFill>
+              <a:schemeClr val="tx1"/>
+            </a:solidFill>
+          </a:ln>
+        </p:spPr>
+        <p:style>
+          <a:lnRef idx="2">
+            <a:schemeClr val="accent1">
+              <a:shade val="50000"/>
+            </a:schemeClr>
+          </a:lnRef>
+          <a:fillRef idx="1">
+            <a:schemeClr val="accent1"/>
+          </a:fillRef>
+          <a:effectRef idx="0">
+            <a:schemeClr val="accent1"/>
+          </a:effectRef>
+          <a:fontRef idx="minor">
+            <a:schemeClr val="lt1"/>
+          </a:fontRef>
+        </p:style>
+        <p:txBody>
+          <a:bodyPr rtlCol="0" anchor="ctr"/>
+          <a:lstStyle/>
+          <a:p>
+            <a:pPr algn="ctr"/>
+            <a:r>
+              <a:rPr lang="en-US" sz="1000" dirty="0" smtClean="0">
+                <a:solidFill>
+                  <a:schemeClr val="tx1"/>
+                </a:solidFill>
+              </a:rPr>
+              <a:t>Exit</a:t>
+            </a:r>
+            <a:endParaRPr lang="en-US" sz="1000" dirty="0">
+              <a:solidFill>
+                <a:schemeClr val="tx1"/>
+              </a:solidFill>
+            </a:endParaRPr>
+          </a:p>
+        </p:txBody>
+      </p:sp>
+      <p:grpSp>
+        <p:nvGrpSpPr>
+          <p:cNvPr id="31" name="Group 30"/>
+          <p:cNvGrpSpPr/>
+          <p:nvPr/>
+        </p:nvGrpSpPr>
+        <p:grpSpPr>
+          <a:xfrm>
+            <a:off x="4382770" y="1267498"/>
+            <a:ext cx="365760" cy="548640"/>
+            <a:chOff x="961494" y="1216584"/>
+            <a:chExt cx="643612" cy="690705"/>
+          </a:xfrm>
+        </p:grpSpPr>
+        <p:sp>
+          <p:nvSpPr>
+            <p:cNvPr id="32" name="Rectangle 31"/>
+            <p:cNvSpPr/>
+            <p:nvPr/>
+          </p:nvSpPr>
+          <p:spPr>
+            <a:xfrm>
+              <a:off x="961494" y="1216584"/>
+              <a:ext cx="643612" cy="690705"/>
+            </a:xfrm>
+            <a:prstGeom prst="rect">
+              <a:avLst/>
+            </a:prstGeom>
+            <a:solidFill>
+              <a:srgbClr val="0070C0"/>
+            </a:solidFill>
+            <a:ln>
+              <a:solidFill>
+                <a:schemeClr val="tx1"/>
+              </a:solidFill>
+            </a:ln>
+          </p:spPr>
+          <p:style>
+            <a:lnRef idx="2">
+              <a:schemeClr val="accent1">
+                <a:shade val="50000"/>
+              </a:schemeClr>
+            </a:lnRef>
+            <a:fillRef idx="1">
+              <a:schemeClr val="accent1"/>
+            </a:fillRef>
+            <a:effectRef idx="0">
+              <a:schemeClr val="accent1"/>
+            </a:effectRef>
+            <a:fontRef idx="minor">
+              <a:schemeClr val="lt1"/>
+            </a:fontRef>
+          </p:style>
+          <p:txBody>
+            <a:bodyPr rtlCol="0" anchor="ctr"/>
+            <a:lstStyle/>
+            <a:p>
+              <a:pPr algn="ctr"/>
+              <a:endParaRPr lang="en-US"/>
+            </a:p>
+          </p:txBody>
+        </p:sp>
+        <p:sp>
+          <p:nvSpPr>
+            <p:cNvPr id="33" name="Rectangle 32"/>
+            <p:cNvSpPr/>
+            <p:nvPr/>
+          </p:nvSpPr>
+          <p:spPr>
+            <a:xfrm>
+              <a:off x="1213313" y="1342709"/>
+              <a:ext cx="391793" cy="195569"/>
+            </a:xfrm>
+            <a:prstGeom prst="rect">
+              <a:avLst/>
+            </a:prstGeom>
+            <a:solidFill>
+              <a:schemeClr val="tx1"/>
+            </a:solidFill>
+            <a:ln>
+              <a:solidFill>
+                <a:schemeClr val="tx1"/>
+              </a:solidFill>
+            </a:ln>
+          </p:spPr>
+          <p:style>
+            <a:lnRef idx="2">
+              <a:schemeClr val="accent1">
+                <a:shade val="50000"/>
+              </a:schemeClr>
+            </a:lnRef>
+            <a:fillRef idx="1">
+              <a:schemeClr val="accent1"/>
+            </a:fillRef>
+            <a:effectRef idx="0">
+              <a:schemeClr val="accent1"/>
+            </a:effectRef>
+            <a:fontRef idx="minor">
+              <a:schemeClr val="lt1"/>
+            </a:fontRef>
+          </p:style>
+          <p:txBody>
+            <a:bodyPr rtlCol="0" anchor="ctr"/>
+            <a:lstStyle/>
+            <a:p>
+              <a:pPr algn="ctr"/>
+              <a:endParaRPr lang="en-US"/>
+            </a:p>
+          </p:txBody>
+        </p:sp>
+      </p:grpSp>
+      <p:grpSp>
+        <p:nvGrpSpPr>
+          <p:cNvPr id="14" name="Group 13"/>
+          <p:cNvGrpSpPr/>
+          <p:nvPr/>
+        </p:nvGrpSpPr>
+        <p:grpSpPr>
+          <a:xfrm>
+            <a:off x="7542276" y="1267498"/>
+            <a:ext cx="365760" cy="548640"/>
+            <a:chOff x="3347569" y="1585810"/>
+            <a:chExt cx="643612" cy="690705"/>
+          </a:xfrm>
+        </p:grpSpPr>
+        <p:sp>
+          <p:nvSpPr>
+            <p:cNvPr id="12" name="Rectangle 11"/>
+            <p:cNvSpPr/>
+            <p:nvPr/>
+          </p:nvSpPr>
+          <p:spPr>
+            <a:xfrm>
+              <a:off x="3347569" y="1585810"/>
+              <a:ext cx="643612" cy="690705"/>
+            </a:xfrm>
+            <a:prstGeom prst="rect">
+              <a:avLst/>
+            </a:prstGeom>
+            <a:solidFill>
+              <a:srgbClr val="A50021"/>
+            </a:solidFill>
+            <a:ln>
+              <a:solidFill>
+                <a:schemeClr val="tx1"/>
+              </a:solidFill>
+            </a:ln>
+          </p:spPr>
+          <p:style>
+            <a:lnRef idx="2">
+              <a:schemeClr val="accent1">
+                <a:shade val="50000"/>
+              </a:schemeClr>
+            </a:lnRef>
+            <a:fillRef idx="1">
+              <a:schemeClr val="accent1"/>
+            </a:fillRef>
+            <a:effectRef idx="0">
+              <a:schemeClr val="accent1"/>
+            </a:effectRef>
+            <a:fontRef idx="minor">
+              <a:schemeClr val="lt1"/>
+            </a:fontRef>
+          </p:style>
+          <p:txBody>
+            <a:bodyPr rtlCol="0" anchor="ctr"/>
+            <a:lstStyle/>
+            <a:p>
+              <a:pPr algn="ctr"/>
+              <a:endParaRPr lang="en-US"/>
+            </a:p>
+          </p:txBody>
+        </p:sp>
+        <p:sp>
+          <p:nvSpPr>
+            <p:cNvPr id="13" name="Rectangle 12"/>
+            <p:cNvSpPr/>
+            <p:nvPr/>
+          </p:nvSpPr>
+          <p:spPr>
+            <a:xfrm>
+              <a:off x="3347569" y="1711935"/>
+              <a:ext cx="391793" cy="195569"/>
+            </a:xfrm>
+            <a:prstGeom prst="rect">
+              <a:avLst/>
+            </a:prstGeom>
+            <a:solidFill>
+              <a:schemeClr val="tx1"/>
+            </a:solidFill>
+            <a:ln>
+              <a:solidFill>
+                <a:schemeClr val="tx1"/>
+              </a:solidFill>
+            </a:ln>
+          </p:spPr>
+          <p:style>
+            <a:lnRef idx="2">
+              <a:schemeClr val="accent1">
+                <a:shade val="50000"/>
+              </a:schemeClr>
+            </a:lnRef>
+            <a:fillRef idx="1">
+              <a:schemeClr val="accent1"/>
+            </a:fillRef>
+            <a:effectRef idx="0">
+              <a:schemeClr val="accent1"/>
+            </a:effectRef>
+            <a:fontRef idx="minor">
+              <a:schemeClr val="lt1"/>
+            </a:fontRef>
+          </p:style>
+          <p:txBody>
+            <a:bodyPr rtlCol="0" anchor="ctr"/>
+            <a:lstStyle/>
+            <a:p>
+              <a:pPr algn="ctr"/>
+              <a:endParaRPr lang="en-US"/>
+            </a:p>
+          </p:txBody>
+        </p:sp>
+      </p:grpSp>
+      <p:sp>
+        <p:nvSpPr>
+          <p:cNvPr id="34" name="TextBox 33"/>
+          <p:cNvSpPr txBox="1"/>
+          <p:nvPr/>
+        </p:nvSpPr>
+        <p:spPr>
+          <a:xfrm>
+            <a:off x="4145089" y="72991"/>
+            <a:ext cx="3695045" cy="276999"/>
+          </a:xfrm>
+          <a:prstGeom prst="rect">
+            <a:avLst/>
+          </a:prstGeom>
+          <a:noFill/>
+        </p:spPr>
+        <p:txBody>
+          <a:bodyPr wrap="square" rtlCol="0">
+            <a:spAutoFit/>
+          </a:bodyPr>
+          <a:lstStyle/>
+          <a:p>
+            <a:r>
+              <a:rPr lang="en-US" sz="1200" dirty="0" smtClean="0">
+                <a:latin typeface="Comic Sans MS" panose="030F0702030302020204" pitchFamily="66" charset="0"/>
+              </a:rPr>
+              <a:t>Encountered a red character.</a:t>
+            </a:r>
+          </a:p>
+        </p:txBody>
+      </p:sp>
+      <p:grpSp>
+        <p:nvGrpSpPr>
+          <p:cNvPr id="39" name="Group 38"/>
+          <p:cNvGrpSpPr/>
+          <p:nvPr/>
+        </p:nvGrpSpPr>
+        <p:grpSpPr>
+          <a:xfrm>
+            <a:off x="4463354" y="499999"/>
+            <a:ext cx="3296072" cy="274713"/>
+            <a:chOff x="4463354" y="466219"/>
+            <a:chExt cx="3296072" cy="274713"/>
+          </a:xfrm>
+        </p:grpSpPr>
+        <p:sp>
+          <p:nvSpPr>
+            <p:cNvPr id="37" name="TextBox 36"/>
+            <p:cNvSpPr txBox="1"/>
+            <p:nvPr/>
+          </p:nvSpPr>
+          <p:spPr>
+            <a:xfrm>
+              <a:off x="4463354" y="495853"/>
+              <a:ext cx="2747432" cy="215444"/>
+            </a:xfrm>
+            <a:prstGeom prst="rect">
+              <a:avLst/>
+            </a:prstGeom>
+            <a:solidFill>
+              <a:srgbClr val="CC9900"/>
+            </a:solidFill>
+          </p:spPr>
+          <p:txBody>
+            <a:bodyPr wrap="square" rtlCol="0">
+              <a:spAutoFit/>
+            </a:bodyPr>
+            <a:lstStyle/>
+            <a:p>
+              <a:r>
+                <a:rPr lang="en-US" sz="800" dirty="0" smtClean="0">
+                  <a:latin typeface="Comic Sans MS" panose="030F0702030302020204" pitchFamily="66" charset="0"/>
+                </a:rPr>
+                <a:t>Speak to obtain possibly some beneficial information.</a:t>
+              </a:r>
+            </a:p>
+          </p:txBody>
+        </p:sp>
+        <p:sp>
+          <p:nvSpPr>
+            <p:cNvPr id="35" name="Rounded Rectangle 34"/>
+            <p:cNvSpPr/>
+            <p:nvPr/>
+          </p:nvSpPr>
+          <p:spPr>
+            <a:xfrm>
+              <a:off x="7210786" y="466219"/>
+              <a:ext cx="548640" cy="274713"/>
+            </a:xfrm>
+            <a:prstGeom prst="roundRect">
+              <a:avLst/>
+            </a:prstGeom>
+            <a:solidFill>
+              <a:schemeClr val="accent3"/>
+            </a:solidFill>
+            <a:ln>
+              <a:solidFill>
+                <a:schemeClr val="tx1"/>
+              </a:solidFill>
+            </a:ln>
+          </p:spPr>
+          <p:style>
+            <a:lnRef idx="2">
+              <a:schemeClr val="accent1">
+                <a:shade val="50000"/>
+              </a:schemeClr>
+            </a:lnRef>
+            <a:fillRef idx="1">
+              <a:schemeClr val="accent1"/>
+            </a:fillRef>
+            <a:effectRef idx="0">
+              <a:schemeClr val="accent1"/>
+            </a:effectRef>
+            <a:fontRef idx="minor">
+              <a:schemeClr val="lt1"/>
+            </a:fontRef>
+          </p:style>
+          <p:txBody>
+            <a:bodyPr rtlCol="0" anchor="ctr"/>
+            <a:lstStyle/>
+            <a:p>
+              <a:pPr algn="ctr"/>
+              <a:r>
+                <a:rPr lang="en-US" sz="1000" dirty="0" smtClean="0">
+                  <a:solidFill>
+                    <a:schemeClr val="tx1"/>
+                  </a:solidFill>
+                </a:rPr>
+                <a:t>Talk</a:t>
+              </a:r>
+              <a:endParaRPr lang="en-US" sz="1000" dirty="0">
+                <a:solidFill>
+                  <a:schemeClr val="tx1"/>
+                </a:solidFill>
+              </a:endParaRPr>
+            </a:p>
+          </p:txBody>
+        </p:sp>
+      </p:grpSp>
+      <p:grpSp>
+        <p:nvGrpSpPr>
+          <p:cNvPr id="40" name="Group 39"/>
+          <p:cNvGrpSpPr/>
+          <p:nvPr/>
+        </p:nvGrpSpPr>
+        <p:grpSpPr>
+          <a:xfrm>
+            <a:off x="4463354" y="839830"/>
+            <a:ext cx="3296072" cy="274713"/>
+            <a:chOff x="4463354" y="466219"/>
+            <a:chExt cx="3296072" cy="274713"/>
+          </a:xfrm>
+        </p:grpSpPr>
+        <p:sp>
+          <p:nvSpPr>
+            <p:cNvPr id="41" name="TextBox 40"/>
+            <p:cNvSpPr txBox="1"/>
+            <p:nvPr/>
+          </p:nvSpPr>
+          <p:spPr>
+            <a:xfrm>
+              <a:off x="4463354" y="495853"/>
+              <a:ext cx="2747432" cy="215444"/>
+            </a:xfrm>
+            <a:prstGeom prst="rect">
+              <a:avLst/>
+            </a:prstGeom>
+            <a:solidFill>
+              <a:srgbClr val="CC9900"/>
+            </a:solidFill>
+          </p:spPr>
+          <p:txBody>
+            <a:bodyPr wrap="square" rtlCol="0">
+              <a:spAutoFit/>
+            </a:bodyPr>
+            <a:lstStyle/>
+            <a:p>
+              <a:r>
+                <a:rPr lang="en-US" sz="800" dirty="0" smtClean="0">
+                  <a:latin typeface="Comic Sans MS" panose="030F0702030302020204" pitchFamily="66" charset="0"/>
+                </a:rPr>
+                <a:t>Don’t bother with this young beggar.</a:t>
+              </a:r>
+            </a:p>
+          </p:txBody>
+        </p:sp>
+        <p:sp>
+          <p:nvSpPr>
+            <p:cNvPr id="42" name="Rounded Rectangle 41"/>
+            <p:cNvSpPr/>
+            <p:nvPr/>
+          </p:nvSpPr>
+          <p:spPr>
+            <a:xfrm>
+              <a:off x="7210786" y="466219"/>
+              <a:ext cx="548640" cy="274713"/>
+            </a:xfrm>
+            <a:prstGeom prst="roundRect">
+              <a:avLst/>
+            </a:prstGeom>
+            <a:solidFill>
+              <a:schemeClr val="accent3"/>
+            </a:solidFill>
+            <a:ln>
+              <a:solidFill>
+                <a:schemeClr val="tx1"/>
+              </a:solidFill>
+            </a:ln>
+          </p:spPr>
+          <p:style>
+            <a:lnRef idx="2">
+              <a:schemeClr val="accent1">
+                <a:shade val="50000"/>
+              </a:schemeClr>
+            </a:lnRef>
+            <a:fillRef idx="1">
+              <a:schemeClr val="accent1"/>
+            </a:fillRef>
+            <a:effectRef idx="0">
+              <a:schemeClr val="accent1"/>
+            </a:effectRef>
+            <a:fontRef idx="minor">
+              <a:schemeClr val="lt1"/>
+            </a:fontRef>
+          </p:style>
+          <p:txBody>
+            <a:bodyPr rtlCol="0" anchor="ctr"/>
+            <a:lstStyle/>
+            <a:p>
+              <a:pPr algn="ctr"/>
+              <a:r>
+                <a:rPr lang="en-US" sz="1000" dirty="0" smtClean="0">
+                  <a:solidFill>
+                    <a:schemeClr val="tx1"/>
+                  </a:solidFill>
+                </a:rPr>
+                <a:t>Leave</a:t>
+              </a:r>
+              <a:endParaRPr lang="en-US" sz="1000" dirty="0">
+                <a:solidFill>
+                  <a:schemeClr val="tx1"/>
+                </a:solidFill>
+              </a:endParaRPr>
+            </a:p>
+          </p:txBody>
+        </p:sp>
+      </p:grpSp>
+      <p:grpSp>
+        <p:nvGrpSpPr>
+          <p:cNvPr id="71" name="Group 70"/>
+          <p:cNvGrpSpPr/>
+          <p:nvPr/>
+        </p:nvGrpSpPr>
+        <p:grpSpPr>
+          <a:xfrm>
+            <a:off x="10025803" y="1257163"/>
+            <a:ext cx="365760" cy="548640"/>
+            <a:chOff x="961494" y="1216584"/>
+            <a:chExt cx="643612" cy="690705"/>
+          </a:xfrm>
+        </p:grpSpPr>
+        <p:sp>
+          <p:nvSpPr>
+            <p:cNvPr id="72" name="Rectangle 71"/>
+            <p:cNvSpPr/>
+            <p:nvPr/>
+          </p:nvSpPr>
+          <p:spPr>
+            <a:xfrm>
+              <a:off x="961494" y="1216584"/>
+              <a:ext cx="643612" cy="690705"/>
+            </a:xfrm>
+            <a:prstGeom prst="rect">
+              <a:avLst/>
+            </a:prstGeom>
+            <a:solidFill>
+              <a:srgbClr val="0070C0"/>
+            </a:solidFill>
+            <a:ln>
+              <a:solidFill>
+                <a:schemeClr val="tx1"/>
+              </a:solidFill>
+            </a:ln>
+          </p:spPr>
+          <p:style>
+            <a:lnRef idx="2">
+              <a:schemeClr val="accent1">
+                <a:shade val="50000"/>
+              </a:schemeClr>
+            </a:lnRef>
+            <a:fillRef idx="1">
+              <a:schemeClr val="accent1"/>
+            </a:fillRef>
+            <a:effectRef idx="0">
+              <a:schemeClr val="accent1"/>
+            </a:effectRef>
+            <a:fontRef idx="minor">
+              <a:schemeClr val="lt1"/>
+            </a:fontRef>
+          </p:style>
+          <p:txBody>
+            <a:bodyPr rtlCol="0" anchor="ctr"/>
+            <a:lstStyle/>
+            <a:p>
+              <a:pPr algn="ctr"/>
+              <a:endParaRPr lang="en-US"/>
+            </a:p>
+          </p:txBody>
+        </p:sp>
+        <p:sp>
+          <p:nvSpPr>
+            <p:cNvPr id="73" name="Rectangle 72"/>
+            <p:cNvSpPr/>
+            <p:nvPr/>
+          </p:nvSpPr>
+          <p:spPr>
+            <a:xfrm>
+              <a:off x="1213313" y="1342709"/>
+              <a:ext cx="391793" cy="195569"/>
+            </a:xfrm>
+            <a:prstGeom prst="rect">
+              <a:avLst/>
+            </a:prstGeom>
+            <a:solidFill>
+              <a:schemeClr val="tx1"/>
+            </a:solidFill>
+            <a:ln>
+              <a:solidFill>
+                <a:schemeClr val="tx1"/>
+              </a:solidFill>
+            </a:ln>
+          </p:spPr>
+          <p:style>
+            <a:lnRef idx="2">
+              <a:schemeClr val="accent1">
+                <a:shade val="50000"/>
+              </a:schemeClr>
+            </a:lnRef>
+            <a:fillRef idx="1">
+              <a:schemeClr val="accent1"/>
+            </a:fillRef>
+            <a:effectRef idx="0">
+              <a:schemeClr val="accent1"/>
+            </a:effectRef>
+            <a:fontRef idx="minor">
+              <a:schemeClr val="lt1"/>
+            </a:fontRef>
+          </p:style>
+          <p:txBody>
+            <a:bodyPr rtlCol="0" anchor="ctr"/>
+            <a:lstStyle/>
+            <a:p>
+              <a:pPr algn="ctr"/>
+              <a:endParaRPr lang="en-US"/>
+            </a:p>
+          </p:txBody>
+        </p:sp>
+      </p:grpSp>
+      <p:sp>
+        <p:nvSpPr>
+          <p:cNvPr id="74" name="TextBox 73"/>
+          <p:cNvSpPr txBox="1"/>
+          <p:nvPr/>
+        </p:nvSpPr>
+        <p:spPr>
+          <a:xfrm>
+            <a:off x="8205025" y="72991"/>
+            <a:ext cx="3695045" cy="461665"/>
+          </a:xfrm>
+          <a:prstGeom prst="rect">
+            <a:avLst/>
+          </a:prstGeom>
+          <a:noFill/>
+        </p:spPr>
+        <p:txBody>
+          <a:bodyPr wrap="square" rtlCol="0">
+            <a:spAutoFit/>
+          </a:bodyPr>
+          <a:lstStyle/>
+          <a:p>
+            <a:r>
+              <a:rPr lang="en-US" sz="1200" dirty="0" smtClean="0">
+                <a:latin typeface="Comic Sans MS" panose="030F0702030302020204" pitchFamily="66" charset="0"/>
+              </a:rPr>
+              <a:t>You obtained useful information about where to rest this night.</a:t>
+            </a:r>
+          </a:p>
+        </p:txBody>
+      </p:sp>
+      <p:grpSp>
+        <p:nvGrpSpPr>
+          <p:cNvPr id="78" name="Group 77"/>
+          <p:cNvGrpSpPr/>
+          <p:nvPr/>
+        </p:nvGrpSpPr>
+        <p:grpSpPr>
+          <a:xfrm>
+            <a:off x="8488848" y="499999"/>
+            <a:ext cx="3411222" cy="274713"/>
+            <a:chOff x="4377840" y="466219"/>
+            <a:chExt cx="3411222" cy="274713"/>
+          </a:xfrm>
+        </p:grpSpPr>
+        <p:sp>
+          <p:nvSpPr>
+            <p:cNvPr id="79" name="TextBox 78"/>
+            <p:cNvSpPr txBox="1"/>
+            <p:nvPr/>
+          </p:nvSpPr>
+          <p:spPr>
+            <a:xfrm>
+              <a:off x="4377840" y="495853"/>
+              <a:ext cx="2832946" cy="215444"/>
+            </a:xfrm>
+            <a:prstGeom prst="rect">
+              <a:avLst/>
+            </a:prstGeom>
+            <a:solidFill>
+              <a:srgbClr val="CC9900"/>
+            </a:solidFill>
+          </p:spPr>
+          <p:txBody>
+            <a:bodyPr wrap="square" rtlCol="0">
+              <a:spAutoFit/>
+            </a:bodyPr>
+            <a:lstStyle/>
+            <a:p>
+              <a:r>
+                <a:rPr lang="en-US" sz="800" dirty="0" smtClean="0">
+                  <a:latin typeface="Comic Sans MS" panose="030F0702030302020204" pitchFamily="66" charset="0"/>
+                </a:rPr>
+                <a:t>Nearest tavern. (</a:t>
+              </a:r>
+              <a:r>
+                <a:rPr lang="en-US" sz="800" dirty="0">
+                  <a:latin typeface="Comic Sans MS" panose="030F0702030302020204" pitchFamily="66" charset="0"/>
+                </a:rPr>
+                <a:t>Cost </a:t>
+              </a:r>
+              <a:r>
+                <a:rPr lang="en-US" sz="800" dirty="0" smtClean="0">
+                  <a:latin typeface="Comic Sans MS" panose="030F0702030302020204" pitchFamily="66" charset="0"/>
+                </a:rPr>
+                <a:t>is negotiable + information)</a:t>
+              </a:r>
+            </a:p>
+          </p:txBody>
+        </p:sp>
+        <p:sp>
+          <p:nvSpPr>
+            <p:cNvPr id="80" name="Rounded Rectangle 79"/>
+            <p:cNvSpPr/>
+            <p:nvPr/>
+          </p:nvSpPr>
+          <p:spPr>
+            <a:xfrm>
+              <a:off x="7210786" y="466219"/>
+              <a:ext cx="578276" cy="274713"/>
+            </a:xfrm>
+            <a:prstGeom prst="roundRect">
+              <a:avLst/>
+            </a:prstGeom>
+            <a:solidFill>
+              <a:schemeClr val="accent3"/>
+            </a:solidFill>
+            <a:ln>
+              <a:solidFill>
+                <a:schemeClr val="tx1"/>
+              </a:solidFill>
+            </a:ln>
+          </p:spPr>
+          <p:style>
+            <a:lnRef idx="2">
+              <a:schemeClr val="accent1">
+                <a:shade val="50000"/>
+              </a:schemeClr>
+            </a:lnRef>
+            <a:fillRef idx="1">
+              <a:schemeClr val="accent1"/>
+            </a:fillRef>
+            <a:effectRef idx="0">
+              <a:schemeClr val="accent1"/>
+            </a:effectRef>
+            <a:fontRef idx="minor">
+              <a:schemeClr val="lt1"/>
+            </a:fontRef>
+          </p:style>
+          <p:txBody>
+            <a:bodyPr rtlCol="0" anchor="ctr"/>
+            <a:lstStyle/>
+            <a:p>
+              <a:pPr algn="ctr"/>
+              <a:r>
+                <a:rPr lang="en-US" sz="1000" dirty="0" smtClean="0">
+                  <a:solidFill>
+                    <a:schemeClr val="tx1"/>
+                  </a:solidFill>
+                </a:rPr>
+                <a:t>Tavern</a:t>
+              </a:r>
+              <a:endParaRPr lang="en-US" sz="1000" dirty="0">
+                <a:solidFill>
+                  <a:schemeClr val="tx1"/>
+                </a:solidFill>
+              </a:endParaRPr>
+            </a:p>
+          </p:txBody>
+        </p:sp>
+      </p:grpSp>
+      <p:grpSp>
+        <p:nvGrpSpPr>
+          <p:cNvPr id="82" name="Group 81"/>
+          <p:cNvGrpSpPr/>
+          <p:nvPr/>
+        </p:nvGrpSpPr>
+        <p:grpSpPr>
+          <a:xfrm>
+            <a:off x="8488848" y="839830"/>
+            <a:ext cx="3411222" cy="274713"/>
+            <a:chOff x="4377840" y="466219"/>
+            <a:chExt cx="3411222" cy="274713"/>
+          </a:xfrm>
+        </p:grpSpPr>
+        <p:sp>
+          <p:nvSpPr>
+            <p:cNvPr id="83" name="TextBox 82"/>
+            <p:cNvSpPr txBox="1"/>
+            <p:nvPr/>
+          </p:nvSpPr>
+          <p:spPr>
+            <a:xfrm>
+              <a:off x="4377840" y="495853"/>
+              <a:ext cx="2832946" cy="215444"/>
+            </a:xfrm>
+            <a:prstGeom prst="rect">
+              <a:avLst/>
+            </a:prstGeom>
+            <a:solidFill>
+              <a:srgbClr val="CC9900"/>
+            </a:solidFill>
+          </p:spPr>
+          <p:txBody>
+            <a:bodyPr wrap="square" rtlCol="0">
+              <a:spAutoFit/>
+            </a:bodyPr>
+            <a:lstStyle/>
+            <a:p>
+              <a:r>
+                <a:rPr lang="en-US" sz="800" dirty="0" smtClean="0">
+                  <a:latin typeface="Comic Sans MS" panose="030F0702030302020204" pitchFamily="66" charset="0"/>
+                </a:rPr>
+                <a:t>At a local farmers hut. (Free of charge if persuaded)</a:t>
+              </a:r>
+            </a:p>
+          </p:txBody>
+        </p:sp>
+        <p:sp>
+          <p:nvSpPr>
+            <p:cNvPr id="84" name="Rounded Rectangle 83"/>
+            <p:cNvSpPr/>
+            <p:nvPr/>
+          </p:nvSpPr>
+          <p:spPr>
+            <a:xfrm>
+              <a:off x="7210786" y="466219"/>
+              <a:ext cx="578276" cy="274713"/>
+            </a:xfrm>
+            <a:prstGeom prst="roundRect">
+              <a:avLst/>
+            </a:prstGeom>
+            <a:solidFill>
+              <a:schemeClr val="accent3"/>
+            </a:solidFill>
+            <a:ln>
+              <a:solidFill>
+                <a:schemeClr val="tx1"/>
+              </a:solidFill>
+            </a:ln>
+          </p:spPr>
+          <p:style>
+            <a:lnRef idx="2">
+              <a:schemeClr val="accent1">
+                <a:shade val="50000"/>
+              </a:schemeClr>
+            </a:lnRef>
+            <a:fillRef idx="1">
+              <a:schemeClr val="accent1"/>
+            </a:fillRef>
+            <a:effectRef idx="0">
+              <a:schemeClr val="accent1"/>
+            </a:effectRef>
+            <a:fontRef idx="minor">
+              <a:schemeClr val="lt1"/>
+            </a:fontRef>
+          </p:style>
+          <p:txBody>
+            <a:bodyPr rtlCol="0" anchor="ctr"/>
+            <a:lstStyle/>
+            <a:p>
+              <a:pPr algn="ctr"/>
+              <a:r>
+                <a:rPr lang="en-US" sz="1000" dirty="0" smtClean="0">
+                  <a:solidFill>
+                    <a:schemeClr val="tx1"/>
+                  </a:solidFill>
+                </a:rPr>
+                <a:t>Hut</a:t>
+              </a:r>
+              <a:endParaRPr lang="en-US" sz="1000" dirty="0">
+                <a:solidFill>
+                  <a:schemeClr val="tx1"/>
+                </a:solidFill>
+              </a:endParaRPr>
+            </a:p>
+          </p:txBody>
+        </p:sp>
+      </p:grpSp>
+      <p:grpSp>
+        <p:nvGrpSpPr>
+          <p:cNvPr id="85" name="Group 84"/>
+          <p:cNvGrpSpPr/>
+          <p:nvPr/>
+        </p:nvGrpSpPr>
+        <p:grpSpPr>
+          <a:xfrm>
+            <a:off x="1080769" y="3561691"/>
+            <a:ext cx="365760" cy="548640"/>
+            <a:chOff x="961494" y="1216584"/>
+            <a:chExt cx="643612" cy="690705"/>
+          </a:xfrm>
+        </p:grpSpPr>
+        <p:sp>
+          <p:nvSpPr>
+            <p:cNvPr id="86" name="Rectangle 85"/>
+            <p:cNvSpPr/>
+            <p:nvPr/>
+          </p:nvSpPr>
+          <p:spPr>
+            <a:xfrm>
+              <a:off x="961494" y="1216584"/>
+              <a:ext cx="643612" cy="690705"/>
+            </a:xfrm>
+            <a:prstGeom prst="rect">
+              <a:avLst/>
+            </a:prstGeom>
+            <a:solidFill>
+              <a:srgbClr val="0070C0"/>
+            </a:solidFill>
+            <a:ln>
+              <a:solidFill>
+                <a:schemeClr val="tx1"/>
+              </a:solidFill>
+            </a:ln>
+          </p:spPr>
+          <p:style>
+            <a:lnRef idx="2">
+              <a:schemeClr val="accent1">
+                <a:shade val="50000"/>
+              </a:schemeClr>
+            </a:lnRef>
+            <a:fillRef idx="1">
+              <a:schemeClr val="accent1"/>
+            </a:fillRef>
+            <a:effectRef idx="0">
+              <a:schemeClr val="accent1"/>
+            </a:effectRef>
+            <a:fontRef idx="minor">
+              <a:schemeClr val="lt1"/>
+            </a:fontRef>
+          </p:style>
+          <p:txBody>
+            <a:bodyPr rtlCol="0" anchor="ctr"/>
+            <a:lstStyle/>
+            <a:p>
+              <a:pPr algn="ctr"/>
+              <a:endParaRPr lang="en-US"/>
+            </a:p>
+          </p:txBody>
+        </p:sp>
+        <p:sp>
+          <p:nvSpPr>
+            <p:cNvPr id="87" name="Rectangle 86"/>
+            <p:cNvSpPr/>
+            <p:nvPr/>
+          </p:nvSpPr>
+          <p:spPr>
+            <a:xfrm>
+              <a:off x="1213313" y="1342709"/>
+              <a:ext cx="391793" cy="195569"/>
+            </a:xfrm>
+            <a:prstGeom prst="rect">
+              <a:avLst/>
+            </a:prstGeom>
+            <a:solidFill>
+              <a:schemeClr val="tx1"/>
+            </a:solidFill>
+            <a:ln>
+              <a:solidFill>
+                <a:schemeClr val="tx1"/>
+              </a:solidFill>
+            </a:ln>
+          </p:spPr>
+          <p:style>
+            <a:lnRef idx="2">
+              <a:schemeClr val="accent1">
+                <a:shade val="50000"/>
+              </a:schemeClr>
+            </a:lnRef>
+            <a:fillRef idx="1">
+              <a:schemeClr val="accent1"/>
+            </a:fillRef>
+            <a:effectRef idx="0">
+              <a:schemeClr val="accent1"/>
+            </a:effectRef>
+            <a:fontRef idx="minor">
+              <a:schemeClr val="lt1"/>
+            </a:fontRef>
+          </p:style>
+          <p:txBody>
+            <a:bodyPr rtlCol="0" anchor="ctr"/>
+            <a:lstStyle/>
+            <a:p>
+              <a:pPr algn="ctr"/>
+              <a:endParaRPr lang="en-US"/>
+            </a:p>
+          </p:txBody>
+        </p:sp>
+      </p:grpSp>
+      <p:sp>
+        <p:nvSpPr>
+          <p:cNvPr id="88" name="TextBox 87"/>
+          <p:cNvSpPr txBox="1"/>
+          <p:nvPr/>
+        </p:nvSpPr>
+        <p:spPr>
+          <a:xfrm>
+            <a:off x="153054" y="2407527"/>
+            <a:ext cx="3695045" cy="461665"/>
+          </a:xfrm>
+          <a:prstGeom prst="rect">
+            <a:avLst/>
+          </a:prstGeom>
+          <a:noFill/>
+        </p:spPr>
+        <p:txBody>
+          <a:bodyPr wrap="square" rtlCol="0">
+            <a:spAutoFit/>
+          </a:bodyPr>
+          <a:lstStyle/>
+          <a:p>
+            <a:r>
+              <a:rPr lang="en-US" sz="1200" dirty="0" smtClean="0">
+                <a:latin typeface="Comic Sans MS" panose="030F0702030302020204" pitchFamily="66" charset="0"/>
+              </a:rPr>
+              <a:t>You reach the tavern and ask the owner about staying tonight. The cost is 10 gold coins.</a:t>
+            </a:r>
+          </a:p>
+        </p:txBody>
+      </p:sp>
+      <p:grpSp>
+        <p:nvGrpSpPr>
+          <p:cNvPr id="89" name="Group 88"/>
+          <p:cNvGrpSpPr/>
+          <p:nvPr/>
+        </p:nvGrpSpPr>
+        <p:grpSpPr>
+          <a:xfrm>
+            <a:off x="218396" y="2923125"/>
+            <a:ext cx="1724746" cy="274713"/>
+            <a:chOff x="6064316" y="466219"/>
+            <a:chExt cx="1724746" cy="274713"/>
+          </a:xfrm>
+        </p:grpSpPr>
+        <p:sp>
+          <p:nvSpPr>
+            <p:cNvPr id="90" name="TextBox 89"/>
+            <p:cNvSpPr txBox="1"/>
+            <p:nvPr/>
+          </p:nvSpPr>
+          <p:spPr>
+            <a:xfrm>
+              <a:off x="6064316" y="495853"/>
+              <a:ext cx="1146470" cy="215444"/>
+            </a:xfrm>
+            <a:prstGeom prst="rect">
+              <a:avLst/>
+            </a:prstGeom>
+            <a:solidFill>
+              <a:srgbClr val="CC9900"/>
+            </a:solidFill>
+          </p:spPr>
+          <p:txBody>
+            <a:bodyPr wrap="square" rtlCol="0">
+              <a:spAutoFit/>
+            </a:bodyPr>
+            <a:lstStyle/>
+            <a:p>
+              <a:r>
+                <a:rPr lang="en-US" sz="800" dirty="0" smtClean="0">
+                  <a:latin typeface="Comic Sans MS" panose="030F0702030302020204" pitchFamily="66" charset="0"/>
+                </a:rPr>
+                <a:t>Give him the money.</a:t>
+              </a:r>
+            </a:p>
+          </p:txBody>
+        </p:sp>
+        <p:sp>
+          <p:nvSpPr>
+            <p:cNvPr id="91" name="Rounded Rectangle 90"/>
+            <p:cNvSpPr/>
+            <p:nvPr/>
+          </p:nvSpPr>
+          <p:spPr>
+            <a:xfrm>
+              <a:off x="7210786" y="466219"/>
+              <a:ext cx="578276" cy="274713"/>
+            </a:xfrm>
+            <a:prstGeom prst="roundRect">
+              <a:avLst/>
+            </a:prstGeom>
+            <a:solidFill>
+              <a:schemeClr val="accent3"/>
+            </a:solidFill>
+            <a:ln>
+              <a:solidFill>
+                <a:schemeClr val="tx1"/>
+              </a:solidFill>
+            </a:ln>
+          </p:spPr>
+          <p:style>
+            <a:lnRef idx="2">
+              <a:schemeClr val="accent1">
+                <a:shade val="50000"/>
+              </a:schemeClr>
+            </a:lnRef>
+            <a:fillRef idx="1">
+              <a:schemeClr val="accent1"/>
+            </a:fillRef>
+            <a:effectRef idx="0">
+              <a:schemeClr val="accent1"/>
+            </a:effectRef>
+            <a:fontRef idx="minor">
+              <a:schemeClr val="lt1"/>
+            </a:fontRef>
+          </p:style>
+          <p:txBody>
+            <a:bodyPr rtlCol="0" anchor="ctr"/>
+            <a:lstStyle/>
+            <a:p>
+              <a:pPr algn="ctr"/>
+              <a:r>
+                <a:rPr lang="en-US" sz="1000" dirty="0" smtClean="0">
+                  <a:solidFill>
+                    <a:schemeClr val="tx1"/>
+                  </a:solidFill>
+                </a:rPr>
+                <a:t>Pay</a:t>
+              </a:r>
+              <a:endParaRPr lang="en-US" sz="1000" dirty="0">
+                <a:solidFill>
+                  <a:schemeClr val="tx1"/>
+                </a:solidFill>
+              </a:endParaRPr>
+            </a:p>
+          </p:txBody>
+        </p:sp>
+      </p:grpSp>
+      <p:grpSp>
+        <p:nvGrpSpPr>
+          <p:cNvPr id="92" name="Group 91"/>
+          <p:cNvGrpSpPr/>
+          <p:nvPr/>
+        </p:nvGrpSpPr>
+        <p:grpSpPr>
+          <a:xfrm>
+            <a:off x="3299460" y="3542898"/>
+            <a:ext cx="365760" cy="548640"/>
+            <a:chOff x="3347569" y="1585810"/>
+            <a:chExt cx="643612" cy="690705"/>
+          </a:xfrm>
+        </p:grpSpPr>
+        <p:sp>
+          <p:nvSpPr>
+            <p:cNvPr id="93" name="Rectangle 92"/>
+            <p:cNvSpPr/>
+            <p:nvPr/>
+          </p:nvSpPr>
+          <p:spPr>
+            <a:xfrm>
+              <a:off x="3347569" y="1585810"/>
+              <a:ext cx="643612" cy="690705"/>
+            </a:xfrm>
+            <a:prstGeom prst="rect">
+              <a:avLst/>
+            </a:prstGeom>
+            <a:solidFill>
+              <a:srgbClr val="A50021"/>
+            </a:solidFill>
+            <a:ln>
+              <a:solidFill>
+                <a:schemeClr val="tx1"/>
+              </a:solidFill>
+            </a:ln>
+          </p:spPr>
+          <p:style>
+            <a:lnRef idx="2">
+              <a:schemeClr val="accent1">
+                <a:shade val="50000"/>
+              </a:schemeClr>
+            </a:lnRef>
+            <a:fillRef idx="1">
+              <a:schemeClr val="accent1"/>
+            </a:fillRef>
+            <a:effectRef idx="0">
+              <a:schemeClr val="accent1"/>
+            </a:effectRef>
+            <a:fontRef idx="minor">
+              <a:schemeClr val="lt1"/>
+            </a:fontRef>
+          </p:style>
+          <p:txBody>
+            <a:bodyPr rtlCol="0" anchor="ctr"/>
+            <a:lstStyle/>
+            <a:p>
+              <a:pPr algn="ctr"/>
+              <a:endParaRPr lang="en-US"/>
+            </a:p>
+          </p:txBody>
+        </p:sp>
+        <p:sp>
+          <p:nvSpPr>
+            <p:cNvPr id="94" name="Rectangle 93"/>
+            <p:cNvSpPr/>
+            <p:nvPr/>
+          </p:nvSpPr>
+          <p:spPr>
+            <a:xfrm>
+              <a:off x="3347569" y="1711935"/>
+              <a:ext cx="391793" cy="195569"/>
+            </a:xfrm>
+            <a:prstGeom prst="rect">
+              <a:avLst/>
+            </a:prstGeom>
+            <a:solidFill>
+              <a:schemeClr val="tx1"/>
+            </a:solidFill>
+            <a:ln>
+              <a:solidFill>
+                <a:schemeClr val="tx1"/>
+              </a:solidFill>
+            </a:ln>
+          </p:spPr>
+          <p:style>
+            <a:lnRef idx="2">
+              <a:schemeClr val="accent1">
+                <a:shade val="50000"/>
+              </a:schemeClr>
+            </a:lnRef>
+            <a:fillRef idx="1">
+              <a:schemeClr val="accent1"/>
+            </a:fillRef>
+            <a:effectRef idx="0">
+              <a:schemeClr val="accent1"/>
+            </a:effectRef>
+            <a:fontRef idx="minor">
+              <a:schemeClr val="lt1"/>
+            </a:fontRef>
+          </p:style>
+          <p:txBody>
+            <a:bodyPr rtlCol="0" anchor="ctr"/>
+            <a:lstStyle/>
+            <a:p>
+              <a:pPr algn="ctr"/>
+              <a:endParaRPr lang="en-US"/>
+            </a:p>
+          </p:txBody>
+        </p:sp>
+      </p:grpSp>
     </p:spTree>
     <p:extLst>
       <p:ext uri="{BB962C8B-B14F-4D97-AF65-F5344CB8AC3E}">

</xml_diff>

<commit_message>
Story Mechanic System Designed
</commit_message>
<xml_diff>
--- a/gameJamName/gameJamName - Image Files/gameJamName - Image Initializer.pptx
+++ b/gameJamName/gameJamName - Image Files/gameJamName - Image Initializer.pptx
@@ -245,7 +245,7 @@
           <a:p>
             <a:fld id="{1CB1AD02-714A-4324-8EFD-214DDF861471}" type="datetimeFigureOut">
               <a:rPr lang="en-US" smtClean="0"/>
-              <a:t>9/15/2022</a:t>
+              <a:t>9/16/2022</a:t>
             </a:fld>
             <a:endParaRPr lang="en-US"/>
           </a:p>
@@ -415,7 +415,7 @@
           <a:p>
             <a:fld id="{1CB1AD02-714A-4324-8EFD-214DDF861471}" type="datetimeFigureOut">
               <a:rPr lang="en-US" smtClean="0"/>
-              <a:t>9/15/2022</a:t>
+              <a:t>9/16/2022</a:t>
             </a:fld>
             <a:endParaRPr lang="en-US"/>
           </a:p>
@@ -595,7 +595,7 @@
           <a:p>
             <a:fld id="{1CB1AD02-714A-4324-8EFD-214DDF861471}" type="datetimeFigureOut">
               <a:rPr lang="en-US" smtClean="0"/>
-              <a:t>9/15/2022</a:t>
+              <a:t>9/16/2022</a:t>
             </a:fld>
             <a:endParaRPr lang="en-US"/>
           </a:p>
@@ -765,7 +765,7 @@
           <a:p>
             <a:fld id="{1CB1AD02-714A-4324-8EFD-214DDF861471}" type="datetimeFigureOut">
               <a:rPr lang="en-US" smtClean="0"/>
-              <a:t>9/15/2022</a:t>
+              <a:t>9/16/2022</a:t>
             </a:fld>
             <a:endParaRPr lang="en-US"/>
           </a:p>
@@ -1011,7 +1011,7 @@
           <a:p>
             <a:fld id="{1CB1AD02-714A-4324-8EFD-214DDF861471}" type="datetimeFigureOut">
               <a:rPr lang="en-US" smtClean="0"/>
-              <a:t>9/15/2022</a:t>
+              <a:t>9/16/2022</a:t>
             </a:fld>
             <a:endParaRPr lang="en-US"/>
           </a:p>
@@ -1243,7 +1243,7 @@
           <a:p>
             <a:fld id="{1CB1AD02-714A-4324-8EFD-214DDF861471}" type="datetimeFigureOut">
               <a:rPr lang="en-US" smtClean="0"/>
-              <a:t>9/15/2022</a:t>
+              <a:t>9/16/2022</a:t>
             </a:fld>
             <a:endParaRPr lang="en-US"/>
           </a:p>
@@ -1610,7 +1610,7 @@
           <a:p>
             <a:fld id="{1CB1AD02-714A-4324-8EFD-214DDF861471}" type="datetimeFigureOut">
               <a:rPr lang="en-US" smtClean="0"/>
-              <a:t>9/15/2022</a:t>
+              <a:t>9/16/2022</a:t>
             </a:fld>
             <a:endParaRPr lang="en-US"/>
           </a:p>
@@ -1728,7 +1728,7 @@
           <a:p>
             <a:fld id="{1CB1AD02-714A-4324-8EFD-214DDF861471}" type="datetimeFigureOut">
               <a:rPr lang="en-US" smtClean="0"/>
-              <a:t>9/15/2022</a:t>
+              <a:t>9/16/2022</a:t>
             </a:fld>
             <a:endParaRPr lang="en-US"/>
           </a:p>
@@ -1823,7 +1823,7 @@
           <a:p>
             <a:fld id="{1CB1AD02-714A-4324-8EFD-214DDF861471}" type="datetimeFigureOut">
               <a:rPr lang="en-US" smtClean="0"/>
-              <a:t>9/15/2022</a:t>
+              <a:t>9/16/2022</a:t>
             </a:fld>
             <a:endParaRPr lang="en-US"/>
           </a:p>
@@ -2100,7 +2100,7 @@
           <a:p>
             <a:fld id="{1CB1AD02-714A-4324-8EFD-214DDF861471}" type="datetimeFigureOut">
               <a:rPr lang="en-US" smtClean="0"/>
-              <a:t>9/15/2022</a:t>
+              <a:t>9/16/2022</a:t>
             </a:fld>
             <a:endParaRPr lang="en-US"/>
           </a:p>
@@ -2353,7 +2353,7 @@
           <a:p>
             <a:fld id="{1CB1AD02-714A-4324-8EFD-214DDF861471}" type="datetimeFigureOut">
               <a:rPr lang="en-US" smtClean="0"/>
-              <a:t>9/15/2022</a:t>
+              <a:t>9/16/2022</a:t>
             </a:fld>
             <a:endParaRPr lang="en-US"/>
           </a:p>
@@ -2566,7 +2566,7 @@
           <a:p>
             <a:fld id="{1CB1AD02-714A-4324-8EFD-214DDF861471}" type="datetimeFigureOut">
               <a:rPr lang="en-US" smtClean="0"/>
-              <a:t>9/15/2022</a:t>
+              <a:t>9/16/2022</a:t>
             </a:fld>
             <a:endParaRPr lang="en-US"/>
           </a:p>
@@ -6547,6 +6547,546 @@
           </a:p>
         </p:txBody>
       </p:sp>
+      <p:grpSp>
+        <p:nvGrpSpPr>
+          <p:cNvPr id="32" name="Group 31"/>
+          <p:cNvGrpSpPr/>
+          <p:nvPr/>
+        </p:nvGrpSpPr>
+        <p:grpSpPr>
+          <a:xfrm>
+            <a:off x="5954395" y="3063875"/>
+            <a:ext cx="1188720" cy="1188720"/>
+            <a:chOff x="6370320" y="3105150"/>
+            <a:chExt cx="1371600" cy="1371600"/>
+          </a:xfrm>
+        </p:grpSpPr>
+        <p:sp>
+          <p:nvSpPr>
+            <p:cNvPr id="2" name="Oval 1"/>
+            <p:cNvSpPr/>
+            <p:nvPr/>
+          </p:nvSpPr>
+          <p:spPr>
+            <a:xfrm>
+              <a:off x="6370320" y="3105150"/>
+              <a:ext cx="1371600" cy="1371600"/>
+            </a:xfrm>
+            <a:prstGeom prst="ellipse">
+              <a:avLst/>
+            </a:prstGeom>
+            <a:solidFill>
+              <a:schemeClr val="accent4"/>
+            </a:solidFill>
+            <a:ln w="38100">
+              <a:solidFill>
+                <a:schemeClr val="tx1"/>
+              </a:solidFill>
+            </a:ln>
+          </p:spPr>
+          <p:style>
+            <a:lnRef idx="2">
+              <a:schemeClr val="accent1">
+                <a:shade val="50000"/>
+              </a:schemeClr>
+            </a:lnRef>
+            <a:fillRef idx="1">
+              <a:schemeClr val="accent1"/>
+            </a:fillRef>
+            <a:effectRef idx="0">
+              <a:schemeClr val="accent1"/>
+            </a:effectRef>
+            <a:fontRef idx="minor">
+              <a:schemeClr val="lt1"/>
+            </a:fontRef>
+          </p:style>
+          <p:txBody>
+            <a:bodyPr rtlCol="0" anchor="ctr"/>
+            <a:lstStyle/>
+            <a:p>
+              <a:pPr algn="ctr"/>
+              <a:endParaRPr lang="en-US"/>
+            </a:p>
+          </p:txBody>
+        </p:sp>
+        <p:sp>
+          <p:nvSpPr>
+            <p:cNvPr id="20" name="Oval 19"/>
+            <p:cNvSpPr/>
+            <p:nvPr/>
+          </p:nvSpPr>
+          <p:spPr>
+            <a:xfrm>
+              <a:off x="6461760" y="3196590"/>
+              <a:ext cx="1188720" cy="1188720"/>
+            </a:xfrm>
+            <a:prstGeom prst="ellipse">
+              <a:avLst/>
+            </a:prstGeom>
+            <a:solidFill>
+              <a:schemeClr val="bg2">
+                <a:lumMod val="90000"/>
+              </a:schemeClr>
+            </a:solidFill>
+            <a:ln w="38100">
+              <a:solidFill>
+                <a:schemeClr val="tx1"/>
+              </a:solidFill>
+            </a:ln>
+          </p:spPr>
+          <p:style>
+            <a:lnRef idx="2">
+              <a:schemeClr val="accent1">
+                <a:shade val="50000"/>
+              </a:schemeClr>
+            </a:lnRef>
+            <a:fillRef idx="1">
+              <a:schemeClr val="accent1"/>
+            </a:fillRef>
+            <a:effectRef idx="0">
+              <a:schemeClr val="accent1"/>
+            </a:effectRef>
+            <a:fontRef idx="minor">
+              <a:schemeClr val="lt1"/>
+            </a:fontRef>
+          </p:style>
+          <p:txBody>
+            <a:bodyPr rtlCol="0" anchor="ctr"/>
+            <a:lstStyle/>
+            <a:p>
+              <a:pPr algn="ctr"/>
+              <a:endParaRPr lang="en-US"/>
+            </a:p>
+          </p:txBody>
+        </p:sp>
+        <p:grpSp>
+          <p:nvGrpSpPr>
+            <p:cNvPr id="24" name="Group 23"/>
+            <p:cNvGrpSpPr/>
+            <p:nvPr/>
+          </p:nvGrpSpPr>
+          <p:grpSpPr>
+            <a:xfrm>
+              <a:off x="6461760" y="3196590"/>
+              <a:ext cx="1188720" cy="1188720"/>
+              <a:chOff x="6461760" y="3198706"/>
+              <a:chExt cx="1188720" cy="1188720"/>
+            </a:xfrm>
+          </p:grpSpPr>
+          <p:sp>
+            <p:nvSpPr>
+              <p:cNvPr id="22" name="Freeform 21"/>
+              <p:cNvSpPr/>
+              <p:nvPr/>
+            </p:nvSpPr>
+            <p:spPr>
+              <a:xfrm>
+                <a:off x="6461760" y="3198706"/>
+                <a:ext cx="1188720" cy="594360"/>
+              </a:xfrm>
+              <a:custGeom>
+                <a:avLst/>
+                <a:gdLst>
+                  <a:gd name="connsiteX0" fmla="*/ 594360 w 1188720"/>
+                  <a:gd name="connsiteY0" fmla="*/ 0 h 594360"/>
+                  <a:gd name="connsiteX1" fmla="*/ 1188720 w 1188720"/>
+                  <a:gd name="connsiteY1" fmla="*/ 594360 h 594360"/>
+                  <a:gd name="connsiteX2" fmla="*/ 0 w 1188720"/>
+                  <a:gd name="connsiteY2" fmla="*/ 594360 h 594360"/>
+                  <a:gd name="connsiteX3" fmla="*/ 594360 w 1188720"/>
+                  <a:gd name="connsiteY3" fmla="*/ 0 h 594360"/>
+                </a:gdLst>
+                <a:ahLst/>
+                <a:cxnLst>
+                  <a:cxn ang="0">
+                    <a:pos x="connsiteX0" y="connsiteY0"/>
+                  </a:cxn>
+                  <a:cxn ang="0">
+                    <a:pos x="connsiteX1" y="connsiteY1"/>
+                  </a:cxn>
+                  <a:cxn ang="0">
+                    <a:pos x="connsiteX2" y="connsiteY2"/>
+                  </a:cxn>
+                  <a:cxn ang="0">
+                    <a:pos x="connsiteX3" y="connsiteY3"/>
+                  </a:cxn>
+                </a:cxnLst>
+                <a:rect l="l" t="t" r="r" b="b"/>
+                <a:pathLst>
+                  <a:path w="1188720" h="594360">
+                    <a:moveTo>
+                      <a:pt x="594360" y="0"/>
+                    </a:moveTo>
+                    <a:cubicBezTo>
+                      <a:pt x="922616" y="0"/>
+                      <a:pt x="1188720" y="266104"/>
+                      <a:pt x="1188720" y="594360"/>
+                    </a:cubicBezTo>
+                    <a:lnTo>
+                      <a:pt x="0" y="594360"/>
+                    </a:lnTo>
+                    <a:cubicBezTo>
+                      <a:pt x="0" y="266104"/>
+                      <a:pt x="266104" y="0"/>
+                      <a:pt x="594360" y="0"/>
+                    </a:cubicBezTo>
+                    <a:close/>
+                  </a:path>
+                </a:pathLst>
+              </a:custGeom>
+              <a:solidFill>
+                <a:schemeClr val="accent4">
+                  <a:lumMod val="20000"/>
+                  <a:lumOff val="80000"/>
+                </a:schemeClr>
+              </a:solidFill>
+              <a:ln w="38100">
+                <a:noFill/>
+              </a:ln>
+            </p:spPr>
+            <p:style>
+              <a:lnRef idx="2">
+                <a:schemeClr val="accent1">
+                  <a:shade val="50000"/>
+                </a:schemeClr>
+              </a:lnRef>
+              <a:fillRef idx="1">
+                <a:schemeClr val="accent1"/>
+              </a:fillRef>
+              <a:effectRef idx="0">
+                <a:schemeClr val="accent1"/>
+              </a:effectRef>
+              <a:fontRef idx="minor">
+                <a:schemeClr val="lt1"/>
+              </a:fontRef>
+            </p:style>
+            <p:txBody>
+              <a:bodyPr rtlCol="0" anchor="ctr"/>
+              <a:lstStyle/>
+              <a:p>
+                <a:pPr algn="ctr"/>
+                <a:endParaRPr lang="en-US"/>
+              </a:p>
+            </p:txBody>
+          </p:sp>
+          <p:sp>
+            <p:nvSpPr>
+              <p:cNvPr id="23" name="Freeform 22"/>
+              <p:cNvSpPr/>
+              <p:nvPr/>
+            </p:nvSpPr>
+            <p:spPr>
+              <a:xfrm rot="10800000">
+                <a:off x="6461760" y="3793066"/>
+                <a:ext cx="1188720" cy="594360"/>
+              </a:xfrm>
+              <a:custGeom>
+                <a:avLst/>
+                <a:gdLst>
+                  <a:gd name="connsiteX0" fmla="*/ 594360 w 1188720"/>
+                  <a:gd name="connsiteY0" fmla="*/ 0 h 594360"/>
+                  <a:gd name="connsiteX1" fmla="*/ 1188720 w 1188720"/>
+                  <a:gd name="connsiteY1" fmla="*/ 594360 h 594360"/>
+                  <a:gd name="connsiteX2" fmla="*/ 0 w 1188720"/>
+                  <a:gd name="connsiteY2" fmla="*/ 594360 h 594360"/>
+                  <a:gd name="connsiteX3" fmla="*/ 594360 w 1188720"/>
+                  <a:gd name="connsiteY3" fmla="*/ 0 h 594360"/>
+                </a:gdLst>
+                <a:ahLst/>
+                <a:cxnLst>
+                  <a:cxn ang="0">
+                    <a:pos x="connsiteX0" y="connsiteY0"/>
+                  </a:cxn>
+                  <a:cxn ang="0">
+                    <a:pos x="connsiteX1" y="connsiteY1"/>
+                  </a:cxn>
+                  <a:cxn ang="0">
+                    <a:pos x="connsiteX2" y="connsiteY2"/>
+                  </a:cxn>
+                  <a:cxn ang="0">
+                    <a:pos x="connsiteX3" y="connsiteY3"/>
+                  </a:cxn>
+                </a:cxnLst>
+                <a:rect l="l" t="t" r="r" b="b"/>
+                <a:pathLst>
+                  <a:path w="1188720" h="594360">
+                    <a:moveTo>
+                      <a:pt x="594360" y="0"/>
+                    </a:moveTo>
+                    <a:cubicBezTo>
+                      <a:pt x="922616" y="0"/>
+                      <a:pt x="1188720" y="266104"/>
+                      <a:pt x="1188720" y="594360"/>
+                    </a:cubicBezTo>
+                    <a:lnTo>
+                      <a:pt x="0" y="594360"/>
+                    </a:lnTo>
+                    <a:cubicBezTo>
+                      <a:pt x="0" y="266104"/>
+                      <a:pt x="266104" y="0"/>
+                      <a:pt x="594360" y="0"/>
+                    </a:cubicBezTo>
+                    <a:close/>
+                  </a:path>
+                </a:pathLst>
+              </a:custGeom>
+              <a:solidFill>
+                <a:schemeClr val="accent1">
+                  <a:lumMod val="20000"/>
+                  <a:lumOff val="80000"/>
+                </a:schemeClr>
+              </a:solidFill>
+              <a:ln w="38100">
+                <a:noFill/>
+              </a:ln>
+            </p:spPr>
+            <p:style>
+              <a:lnRef idx="2">
+                <a:schemeClr val="accent1">
+                  <a:shade val="50000"/>
+                </a:schemeClr>
+              </a:lnRef>
+              <a:fillRef idx="1">
+                <a:schemeClr val="accent1"/>
+              </a:fillRef>
+              <a:effectRef idx="0">
+                <a:schemeClr val="accent1"/>
+              </a:effectRef>
+              <a:fontRef idx="minor">
+                <a:schemeClr val="lt1"/>
+              </a:fontRef>
+            </p:style>
+            <p:txBody>
+              <a:bodyPr rtlCol="0" anchor="ctr"/>
+              <a:lstStyle/>
+              <a:p>
+                <a:pPr algn="ctr"/>
+                <a:endParaRPr lang="en-US"/>
+              </a:p>
+            </p:txBody>
+          </p:sp>
+        </p:grpSp>
+        <p:sp>
+          <p:nvSpPr>
+            <p:cNvPr id="25" name="Oval 24"/>
+            <p:cNvSpPr/>
+            <p:nvPr/>
+          </p:nvSpPr>
+          <p:spPr>
+            <a:xfrm>
+              <a:off x="6951345" y="3684270"/>
+              <a:ext cx="209550" cy="213360"/>
+            </a:xfrm>
+            <a:prstGeom prst="ellipse">
+              <a:avLst/>
+            </a:prstGeom>
+            <a:solidFill>
+              <a:schemeClr val="accent4"/>
+            </a:solidFill>
+            <a:ln w="38100">
+              <a:solidFill>
+                <a:schemeClr val="tx1"/>
+              </a:solidFill>
+            </a:ln>
+          </p:spPr>
+          <p:style>
+            <a:lnRef idx="2">
+              <a:schemeClr val="accent1">
+                <a:shade val="50000"/>
+              </a:schemeClr>
+            </a:lnRef>
+            <a:fillRef idx="1">
+              <a:schemeClr val="accent1"/>
+            </a:fillRef>
+            <a:effectRef idx="0">
+              <a:schemeClr val="accent1"/>
+            </a:effectRef>
+            <a:fontRef idx="minor">
+              <a:schemeClr val="lt1"/>
+            </a:fontRef>
+          </p:style>
+          <p:txBody>
+            <a:bodyPr rtlCol="0" anchor="ctr"/>
+            <a:lstStyle/>
+            <a:p>
+              <a:pPr algn="ctr"/>
+              <a:endParaRPr lang="en-US"/>
+            </a:p>
+          </p:txBody>
+        </p:sp>
+        <p:sp>
+          <p:nvSpPr>
+            <p:cNvPr id="27" name="Diamond 26"/>
+            <p:cNvSpPr/>
+            <p:nvPr/>
+          </p:nvSpPr>
+          <p:spPr>
+            <a:xfrm>
+              <a:off x="6971821" y="3427274"/>
+              <a:ext cx="168594" cy="329962"/>
+            </a:xfrm>
+            <a:prstGeom prst="diamond">
+              <a:avLst/>
+            </a:prstGeom>
+            <a:solidFill>
+              <a:schemeClr val="accent4"/>
+            </a:solidFill>
+            <a:ln w="38100">
+              <a:solidFill>
+                <a:schemeClr val="tx1"/>
+              </a:solidFill>
+            </a:ln>
+          </p:spPr>
+          <p:style>
+            <a:lnRef idx="2">
+              <a:schemeClr val="accent1">
+                <a:shade val="50000"/>
+              </a:schemeClr>
+            </a:lnRef>
+            <a:fillRef idx="1">
+              <a:schemeClr val="accent1"/>
+            </a:fillRef>
+            <a:effectRef idx="0">
+              <a:schemeClr val="accent1"/>
+            </a:effectRef>
+            <a:fontRef idx="minor">
+              <a:schemeClr val="lt1"/>
+            </a:fontRef>
+          </p:style>
+          <p:txBody>
+            <a:bodyPr rtlCol="0" anchor="ctr"/>
+            <a:lstStyle/>
+            <a:p>
+              <a:pPr algn="ctr"/>
+              <a:endParaRPr lang="en-US"/>
+            </a:p>
+          </p:txBody>
+        </p:sp>
+        <p:sp>
+          <p:nvSpPr>
+            <p:cNvPr id="28" name="TextBox 27"/>
+            <p:cNvSpPr txBox="1"/>
+            <p:nvPr/>
+          </p:nvSpPr>
+          <p:spPr>
+            <a:xfrm>
+              <a:off x="6908481" y="3211830"/>
+              <a:ext cx="295275" cy="195320"/>
+            </a:xfrm>
+            <a:prstGeom prst="rect">
+              <a:avLst/>
+            </a:prstGeom>
+            <a:noFill/>
+          </p:spPr>
+          <p:txBody>
+            <a:bodyPr wrap="square" rtlCol="0">
+              <a:spAutoFit/>
+            </a:bodyPr>
+            <a:lstStyle/>
+            <a:p>
+              <a:pPr algn="ctr"/>
+              <a:r>
+                <a:rPr lang="en-US" sz="500" dirty="0" smtClean="0"/>
+                <a:t>XII</a:t>
+              </a:r>
+              <a:endParaRPr lang="en-US" sz="500" dirty="0"/>
+            </a:p>
+          </p:txBody>
+        </p:sp>
+        <p:sp>
+          <p:nvSpPr>
+            <p:cNvPr id="29" name="TextBox 28"/>
+            <p:cNvSpPr txBox="1"/>
+            <p:nvPr/>
+          </p:nvSpPr>
+          <p:spPr>
+            <a:xfrm>
+              <a:off x="6908481" y="4097262"/>
+              <a:ext cx="295275" cy="195320"/>
+            </a:xfrm>
+            <a:prstGeom prst="rect">
+              <a:avLst/>
+            </a:prstGeom>
+            <a:noFill/>
+          </p:spPr>
+          <p:txBody>
+            <a:bodyPr wrap="square" rtlCol="0">
+              <a:spAutoFit/>
+            </a:bodyPr>
+            <a:lstStyle/>
+            <a:p>
+              <a:pPr algn="ctr"/>
+              <a:r>
+                <a:rPr lang="en-US" sz="500" dirty="0" smtClean="0"/>
+                <a:t>VI</a:t>
+              </a:r>
+              <a:endParaRPr lang="en-US" sz="500" dirty="0"/>
+            </a:p>
+          </p:txBody>
+        </p:sp>
+        <p:sp>
+          <p:nvSpPr>
+            <p:cNvPr id="30" name="TextBox 29"/>
+            <p:cNvSpPr txBox="1"/>
+            <p:nvPr/>
+          </p:nvSpPr>
+          <p:spPr>
+            <a:xfrm>
+              <a:off x="6433898" y="3690213"/>
+              <a:ext cx="295275" cy="195320"/>
+            </a:xfrm>
+            <a:prstGeom prst="rect">
+              <a:avLst/>
+            </a:prstGeom>
+            <a:noFill/>
+          </p:spPr>
+          <p:txBody>
+            <a:bodyPr wrap="square" rtlCol="0">
+              <a:spAutoFit/>
+            </a:bodyPr>
+            <a:lstStyle/>
+            <a:p>
+              <a:pPr algn="ctr"/>
+              <a:r>
+                <a:rPr lang="en-US" sz="500" dirty="0" smtClean="0"/>
+                <a:t>IX</a:t>
+              </a:r>
+              <a:endParaRPr lang="en-US" sz="500" dirty="0"/>
+            </a:p>
+          </p:txBody>
+        </p:sp>
+        <p:sp>
+          <p:nvSpPr>
+            <p:cNvPr id="31" name="TextBox 30"/>
+            <p:cNvSpPr txBox="1"/>
+            <p:nvPr/>
+          </p:nvSpPr>
+          <p:spPr>
+            <a:xfrm>
+              <a:off x="7330678" y="3690213"/>
+              <a:ext cx="295275" cy="195320"/>
+            </a:xfrm>
+            <a:prstGeom prst="rect">
+              <a:avLst/>
+            </a:prstGeom>
+            <a:noFill/>
+          </p:spPr>
+          <p:txBody>
+            <a:bodyPr wrap="square" rtlCol="0">
+              <a:spAutoFit/>
+            </a:bodyPr>
+            <a:lstStyle/>
+            <a:p>
+              <a:pPr algn="ctr"/>
+              <a:r>
+                <a:rPr lang="en-US" sz="500" dirty="0" smtClean="0"/>
+                <a:t>III</a:t>
+              </a:r>
+              <a:endParaRPr lang="en-US" sz="500" dirty="0"/>
+            </a:p>
+          </p:txBody>
+        </p:sp>
+      </p:grpSp>
     </p:spTree>
     <p:extLst>
       <p:ext uri="{BB962C8B-B14F-4D97-AF65-F5344CB8AC3E}">

</xml_diff>

<commit_message>
After Merge UI Update
</commit_message>
<xml_diff>
--- a/gameJamName/gameJamName - Image Files/gameJamName - Image Initializer.pptx
+++ b/gameJamName/gameJamName - Image Files/gameJamName - Image Initializer.pptx
@@ -21008,6 +21008,30 @@
           </a:fontRef>
         </p:style>
       </p:cxnSp>
+      <p:pic>
+        <p:nvPicPr>
+          <p:cNvPr id="2" name="Picture 1"/>
+          <p:cNvPicPr>
+            <a:picLocks noChangeAspect="1"/>
+          </p:cNvPicPr>
+          <p:nvPr/>
+        </p:nvPicPr>
+        <p:blipFill>
+          <a:blip r:embed="rId8"/>
+          <a:stretch>
+            <a:fillRect/>
+          </a:stretch>
+        </p:blipFill>
+        <p:spPr>
+          <a:xfrm>
+            <a:off x="10821800" y="2219984"/>
+            <a:ext cx="329184" cy="329184"/>
+          </a:xfrm>
+          <a:prstGeom prst="rect">
+            <a:avLst/>
+          </a:prstGeom>
+        </p:spPr>
+      </p:pic>
     </p:spTree>
     <p:extLst>
       <p:ext uri="{BB962C8B-B14F-4D97-AF65-F5344CB8AC3E}">

</xml_diff>